<commit_message>
removed footer and improved powerPoint slides
</commit_message>
<xml_diff>
--- a/Talk/Vortrag.pptx
+++ b/Talk/Vortrag.pptx
@@ -9,8 +9,9 @@
     <p:sldId id="263" r:id="rId6"/>
     <p:sldId id="257" r:id="rId7"/>
     <p:sldId id="259" r:id="rId8"/>
-    <p:sldId id="258" r:id="rId9"/>
-    <p:sldId id="262" r:id="rId10"/>
+    <p:sldId id="264" r:id="rId9"/>
+    <p:sldId id="258" r:id="rId10"/>
+    <p:sldId id="262" r:id="rId11"/>
   </p:sldIdLst>
   <p:sldSz cx="9144000" cy="5143500" type="screen16x9"/>
   <p:notesSz cx="6858000" cy="9144000"/>
@@ -122,6 +123,7 @@
         <p14:section name="Agendapunkt 1" id="{5A430938-0EFA-1E46-8C82-07C301215BEA}">
           <p14:sldIdLst>
             <p14:sldId id="259"/>
+            <p14:sldId id="264"/>
             <p14:sldId id="258"/>
           </p14:sldIdLst>
         </p14:section>
@@ -589,6 +591,13 @@
   <p:clrMapOvr>
     <a:masterClrMapping/>
   </p:clrMapOvr>
+  <p:timing>
+    <p:tnLst>
+      <p:par>
+        <p:cTn id="1" dur="indefinite" restart="never" nodeType="tmRoot"/>
+      </p:par>
+    </p:tnLst>
+  </p:timing>
 </p:sldLayout>
 </file>
 
@@ -1030,8 +1039,8 @@
         </p:blipFill>
         <p:spPr>
           <a:xfrm>
-            <a:off x="0" y="1"/>
-            <a:ext cx="9144000" cy="5143500"/>
+            <a:off x="0" y="0"/>
+            <a:ext cx="9144000" cy="5143501"/>
           </a:xfrm>
           <a:prstGeom prst="rect">
             <a:avLst/>
@@ -1200,7 +1209,7 @@
         </p:nvSpPr>
         <p:spPr>
           <a:xfrm>
-            <a:off x="605117" y="1287905"/>
+            <a:off x="605117" y="1861015"/>
             <a:ext cx="8038354" cy="707886"/>
           </a:xfrm>
           <a:prstGeom prst="rect">
@@ -1274,6 +1283,80 @@
           </a:p>
         </p:txBody>
       </p:sp>
+      <p:sp>
+        <p:nvSpPr>
+          <p:cNvPr id="2" name="Rechteck 1"/>
+          <p:cNvSpPr/>
+          <p:nvPr userDrawn="1"/>
+        </p:nvSpPr>
+        <p:spPr>
+          <a:xfrm>
+            <a:off x="1" y="-2158"/>
+            <a:ext cx="9141558" cy="928461"/>
+          </a:xfrm>
+          <a:prstGeom prst="rect">
+            <a:avLst/>
+          </a:prstGeom>
+          <a:solidFill>
+            <a:schemeClr val="bg1"/>
+          </a:solidFill>
+          <a:ln>
+            <a:noFill/>
+          </a:ln>
+        </p:spPr>
+        <p:style>
+          <a:lnRef idx="0">
+            <a:scrgbClr r="0" g="0" b="0"/>
+          </a:lnRef>
+          <a:fillRef idx="0">
+            <a:scrgbClr r="0" g="0" b="0"/>
+          </a:fillRef>
+          <a:effectRef idx="0">
+            <a:scrgbClr r="0" g="0" b="0"/>
+          </a:effectRef>
+          <a:fontRef idx="minor">
+            <a:schemeClr val="lt1"/>
+          </a:fontRef>
+        </p:style>
+        <p:txBody>
+          <a:bodyPr rtlCol="0" anchor="ctr"/>
+          <a:lstStyle/>
+          <a:p>
+            <a:pPr algn="ctr"/>
+            <a:endParaRPr lang="de-DE"/>
+          </a:p>
+        </p:txBody>
+      </p:sp>
+      <p:pic>
+        <p:nvPicPr>
+          <p:cNvPr id="9" name="Bild 8" descr="Logo.png"/>
+          <p:cNvPicPr>
+            <a:picLocks noChangeAspect="1"/>
+          </p:cNvPicPr>
+          <p:nvPr userDrawn="1"/>
+        </p:nvPicPr>
+        <p:blipFill>
+          <a:blip r:embed="rId3">
+            <a:extLst>
+              <a:ext uri="{28A0092B-C50C-407E-A947-70E740481C1C}">
+                <a14:useLocalDpi xmlns:a14="http://schemas.microsoft.com/office/drawing/2010/main" val="0"/>
+              </a:ext>
+            </a:extLst>
+          </a:blip>
+          <a:stretch>
+            <a:fillRect/>
+          </a:stretch>
+        </p:blipFill>
+        <p:spPr>
+          <a:xfrm>
+            <a:off x="457200" y="223254"/>
+            <a:ext cx="2690029" cy="608737"/>
+          </a:xfrm>
+          <a:prstGeom prst="rect">
+            <a:avLst/>
+          </a:prstGeom>
+        </p:spPr>
+      </p:pic>
     </p:spTree>
     <p:extLst>
       <p:ext uri="{BB962C8B-B14F-4D97-AF65-F5344CB8AC3E}">
@@ -1284,6 +1367,13 @@
   <p:clrMapOvr>
     <a:masterClrMapping/>
   </p:clrMapOvr>
+  <p:timing>
+    <p:tnLst>
+      <p:par>
+        <p:cTn id="1" dur="indefinite" restart="never" nodeType="tmRoot"/>
+      </p:par>
+    </p:tnLst>
+  </p:timing>
 </p:sldLayout>
 </file>
 
@@ -2302,6 +2392,98 @@
         </p:nvSpPr>
         <p:spPr>
           <a:xfrm>
+            <a:off x="674120" y="1056319"/>
+            <a:ext cx="7408641" cy="1613462"/>
+          </a:xfrm>
+        </p:spPr>
+        <p:txBody>
+          <a:bodyPr>
+            <a:normAutofit fontScale="90000"/>
+          </a:bodyPr>
+          <a:lstStyle/>
+          <a:p>
+            <a:r>
+              <a:rPr lang="de-DE" sz="4800"/>
+              <a:t>Code auf GitHub:</a:t>
+            </a:r>
+            <a:br>
+              <a:rPr lang="de-DE" sz="4800"/>
+            </a:br>
+            <a:r>
+              <a:rPr lang="de-DE" sz="2700">
+                <a:hlinkClick r:id="rId2"/>
+              </a:rPr>
+              <a:t>https</a:t>
+            </a:r>
+            <a:r>
+              <a:rPr lang="de-DE" sz="2700">
+                <a:hlinkClick r:id="rId2"/>
+              </a:rPr>
+              <a:t>://</a:t>
+            </a:r>
+            <a:r>
+              <a:rPr lang="de-DE" sz="2700" smtClean="0">
+                <a:hlinkClick r:id="rId2"/>
+              </a:rPr>
+              <a:t>github.com/bytePassion/wdc_Talk_ngx-translate</a:t>
+            </a:r>
+            <a:r>
+              <a:rPr lang="de-DE" sz="2700" smtClean="0"/>
+              <a:t> </a:t>
+            </a:r>
+            <a:endParaRPr lang="de-DE" sz="2700" dirty="0"/>
+          </a:p>
+        </p:txBody>
+      </p:sp>
+    </p:spTree>
+    <p:extLst>
+      <p:ext uri="{BB962C8B-B14F-4D97-AF65-F5344CB8AC3E}">
+        <p14:creationId xmlns:p14="http://schemas.microsoft.com/office/powerpoint/2010/main" val="368199686"/>
+      </p:ext>
+    </p:extLst>
+  </p:cSld>
+  <p:clrMapOvr>
+    <a:masterClrMapping/>
+  </p:clrMapOvr>
+  <p:timing>
+    <p:tnLst>
+      <p:par>
+        <p:cTn id="1" dur="indefinite" restart="never" nodeType="tmRoot"/>
+      </p:par>
+    </p:tnLst>
+  </p:timing>
+</p:sld>
+</file>
+
+<file path=ppt/slides/slide6.xml><?xml version="1.0" encoding="utf-8"?>
+<p:sld xmlns:a="http://schemas.openxmlformats.org/drawingml/2006/main" xmlns:r="http://schemas.openxmlformats.org/officeDocument/2006/relationships" xmlns:p="http://schemas.openxmlformats.org/presentationml/2006/main">
+  <p:cSld>
+    <p:spTree>
+      <p:nvGrpSpPr>
+        <p:cNvPr id="1" name=""/>
+        <p:cNvGrpSpPr/>
+        <p:nvPr/>
+      </p:nvGrpSpPr>
+      <p:grpSpPr>
+        <a:xfrm>
+          <a:off x="0" y="0"/>
+          <a:ext cx="0" cy="0"/>
+          <a:chOff x="0" y="0"/>
+          <a:chExt cx="0" cy="0"/>
+        </a:xfrm>
+      </p:grpSpPr>
+      <p:sp>
+        <p:nvSpPr>
+          <p:cNvPr id="6" name="Titel 5"/>
+          <p:cNvSpPr>
+            <a:spLocks noGrp="1"/>
+          </p:cNvSpPr>
+          <p:nvPr>
+            <p:ph type="title"/>
+          </p:nvPr>
+        </p:nvSpPr>
+        <p:spPr>
+          <a:xfrm>
             <a:off x="339634" y="1329621"/>
             <a:ext cx="8347165" cy="2674145"/>
           </a:xfrm>
@@ -2358,7 +2540,7 @@
 </p:sld>
 </file>
 
-<file path=ppt/slides/slide6.xml><?xml version="1.0" encoding="utf-8"?>
+<file path=ppt/slides/slide7.xml><?xml version="1.0" encoding="utf-8"?>
 <p:sld xmlns:a="http://schemas.openxmlformats.org/drawingml/2006/main" xmlns:r="http://schemas.openxmlformats.org/officeDocument/2006/relationships" xmlns:p="http://schemas.openxmlformats.org/presentationml/2006/main">
   <p:cSld>
     <p:spTree>
@@ -2716,20 +2898,20 @@
 </file>
 
 <file path=customXml/item1.xml><?xml version="1.0" encoding="utf-8"?>
-<p:properties xmlns:p="http://schemas.microsoft.com/office/2006/metadata/properties" xmlns:xsi="http://www.w3.org/2001/XMLSchema-instance" xmlns:pc="http://schemas.microsoft.com/office/infopath/2007/PartnerControls">
-  <documentManagement>
-    <cp_x0020_zus_x00e4_tzliche_x0020_Infos xmlns="07b6bc22-5999-492b-a352-9248244f8d21" xsi:nil="true"/>
-  </documentManagement>
-</p:properties>
-</file>
-
-<file path=customXml/item2.xml><?xml version="1.0" encoding="utf-8"?>
 <?mso-contentType ?>
 <FormTemplates xmlns="http://schemas.microsoft.com/sharepoint/v3/contenttype/forms">
   <Display>DocumentLibraryForm</Display>
   <Edit>DocumentLibraryForm</Edit>
   <New>DocumentLibraryForm</New>
 </FormTemplates>
+</file>
+
+<file path=customXml/item2.xml><?xml version="1.0" encoding="utf-8"?>
+<p:properties xmlns:p="http://schemas.microsoft.com/office/2006/metadata/properties" xmlns:xsi="http://www.w3.org/2001/XMLSchema-instance" xmlns:pc="http://schemas.microsoft.com/office/infopath/2007/PartnerControls">
+  <documentManagement>
+    <cp_x0020_zus_x00e4_tzliche_x0020_Infos xmlns="07b6bc22-5999-492b-a352-9248244f8d21" xsi:nil="true"/>
+  </documentManagement>
+</p:properties>
 </file>
 
 <file path=customXml/item3.xml><?xml version="1.0" encoding="utf-8"?>
@@ -2861,19 +3043,19 @@
 </file>
 
 <file path=customXml/itemProps1.xml><?xml version="1.0" encoding="utf-8"?>
+<ds:datastoreItem xmlns:ds="http://schemas.openxmlformats.org/officeDocument/2006/customXml" ds:itemID="{D455443A-2FF7-43ED-8823-8BF9C21F5DB5}">
+  <ds:schemaRefs>
+    <ds:schemaRef ds:uri="http://schemas.microsoft.com/sharepoint/v3/contenttype/forms"/>
+  </ds:schemaRefs>
+</ds:datastoreItem>
+</file>
+
+<file path=customXml/itemProps2.xml><?xml version="1.0" encoding="utf-8"?>
 <ds:datastoreItem xmlns:ds="http://schemas.openxmlformats.org/officeDocument/2006/customXml" ds:itemID="{8F9C27B5-1B11-4041-A3BD-17D71F82D7BE}">
   <ds:schemaRefs>
     <ds:schemaRef ds:uri="http://schemas.microsoft.com/office/2006/metadata/properties"/>
     <ds:schemaRef ds:uri="http://schemas.microsoft.com/office/infopath/2007/PartnerControls"/>
     <ds:schemaRef ds:uri="07b6bc22-5999-492b-a352-9248244f8d21"/>
-  </ds:schemaRefs>
-</ds:datastoreItem>
-</file>
-
-<file path=customXml/itemProps2.xml><?xml version="1.0" encoding="utf-8"?>
-<ds:datastoreItem xmlns:ds="http://schemas.openxmlformats.org/officeDocument/2006/customXml" ds:itemID="{D455443A-2FF7-43ED-8823-8BF9C21F5DB5}">
-  <ds:schemaRefs>
-    <ds:schemaRef ds:uri="http://schemas.microsoft.com/sharepoint/v3/contenttype/forms"/>
   </ds:schemaRefs>
 </ds:datastoreItem>
 </file>

</xml_diff>

<commit_message>
improved slides and more
</commit_message>
<xml_diff>
--- a/Talk/Vortrag.pptx
+++ b/Talk/Vortrag.pptx
@@ -6,12 +6,19 @@
   </p:sldMasterIdLst>
   <p:sldIdLst>
     <p:sldId id="256" r:id="rId5"/>
-    <p:sldId id="263" r:id="rId6"/>
-    <p:sldId id="257" r:id="rId7"/>
-    <p:sldId id="259" r:id="rId8"/>
-    <p:sldId id="264" r:id="rId9"/>
-    <p:sldId id="258" r:id="rId10"/>
-    <p:sldId id="262" r:id="rId11"/>
+    <p:sldId id="267" r:id="rId6"/>
+    <p:sldId id="268" r:id="rId7"/>
+    <p:sldId id="266" r:id="rId8"/>
+    <p:sldId id="263" r:id="rId9"/>
+    <p:sldId id="257" r:id="rId10"/>
+    <p:sldId id="269" r:id="rId11"/>
+    <p:sldId id="270" r:id="rId12"/>
+    <p:sldId id="271" r:id="rId13"/>
+    <p:sldId id="273" r:id="rId14"/>
+    <p:sldId id="274" r:id="rId15"/>
+    <p:sldId id="275" r:id="rId16"/>
+    <p:sldId id="258" r:id="rId17"/>
+    <p:sldId id="262" r:id="rId18"/>
   </p:sldIdLst>
   <p:sldSz cx="9144000" cy="5143500" type="screen16x9"/>
   <p:notesSz cx="6858000" cy="9144000"/>
@@ -116,14 +123,21 @@
         <p14:section name="Standardabschnitt" id="{E80E718C-7E48-6146-A3C5-A5DCE8B20201}">
           <p14:sldIdLst>
             <p14:sldId id="256"/>
+            <p14:sldId id="267"/>
+            <p14:sldId id="268"/>
+            <p14:sldId id="266"/>
             <p14:sldId id="263"/>
             <p14:sldId id="257"/>
           </p14:sldIdLst>
         </p14:section>
         <p14:section name="Agendapunkt 1" id="{5A430938-0EFA-1E46-8C82-07C301215BEA}">
           <p14:sldIdLst>
-            <p14:sldId id="259"/>
-            <p14:sldId id="264"/>
+            <p14:sldId id="269"/>
+            <p14:sldId id="270"/>
+            <p14:sldId id="271"/>
+            <p14:sldId id="273"/>
+            <p14:sldId id="274"/>
+            <p14:sldId id="275"/>
             <p14:sldId id="258"/>
           </p14:sldIdLst>
         </p14:section>
@@ -1877,9 +1891,46 @@
           <a:chExt cx="0" cy="0"/>
         </a:xfrm>
       </p:grpSpPr>
-      <p:sp>
-        <p:nvSpPr>
-          <p:cNvPr id="7" name="Titel 6"/>
+    </p:spTree>
+    <p:extLst>
+      <p:ext uri="{BB962C8B-B14F-4D97-AF65-F5344CB8AC3E}">
+        <p14:creationId xmlns:p14="http://schemas.microsoft.com/office/powerpoint/2010/main" val="306223021"/>
+      </p:ext>
+    </p:extLst>
+  </p:cSld>
+  <p:clrMapOvr>
+    <a:masterClrMapping/>
+  </p:clrMapOvr>
+  <p:timing>
+    <p:tnLst>
+      <p:par>
+        <p:cTn id="1" dur="indefinite" restart="never" nodeType="tmRoot"/>
+      </p:par>
+    </p:tnLst>
+  </p:timing>
+</p:sld>
+</file>
+
+<file path=ppt/slides/slide10.xml><?xml version="1.0" encoding="utf-8"?>
+<p:sld xmlns:a="http://schemas.openxmlformats.org/drawingml/2006/main" xmlns:r="http://schemas.openxmlformats.org/officeDocument/2006/relationships" xmlns:p="http://schemas.openxmlformats.org/presentationml/2006/main">
+  <p:cSld>
+    <p:spTree>
+      <p:nvGrpSpPr>
+        <p:cNvPr id="1" name=""/>
+        <p:cNvGrpSpPr/>
+        <p:nvPr/>
+      </p:nvGrpSpPr>
+      <p:grpSpPr>
+        <a:xfrm>
+          <a:off x="0" y="0"/>
+          <a:ext cx="0" cy="0"/>
+          <a:chOff x="0" y="0"/>
+          <a:chExt cx="0" cy="0"/>
+        </a:xfrm>
+      </p:grpSpPr>
+      <p:sp>
+        <p:nvSpPr>
+          <p:cNvPr id="2" name="Titel 1"/>
           <p:cNvSpPr>
             <a:spLocks noGrp="1"/>
           </p:cNvSpPr>
@@ -1893,17 +1944,604 @@
           <a:lstStyle/>
           <a:p>
             <a:r>
-              <a:rPr lang="de-DE" smtClean="0"/>
-              <a:t>Lokalisierung in Angular (mit ngx-translate)</a:t>
-            </a:r>
-            <a:endParaRPr lang="de-DE" dirty="0"/>
+              <a:rPr lang="en-US" smtClean="0"/>
+              <a:t>3. Installation &amp; Setup</a:t>
+            </a:r>
+            <a:endParaRPr lang="de-DE"/>
+          </a:p>
+        </p:txBody>
+      </p:sp>
+      <p:sp>
+        <p:nvSpPr>
+          <p:cNvPr id="3" name="Inhaltsplatzhalter 2"/>
+          <p:cNvSpPr>
+            <a:spLocks noGrp="1"/>
+          </p:cNvSpPr>
+          <p:nvPr>
+            <p:ph sz="half" idx="1"/>
+          </p:nvPr>
+        </p:nvSpPr>
+        <p:spPr>
+          <a:xfrm>
+            <a:off x="457200" y="1588519"/>
+            <a:ext cx="8229600" cy="3006103"/>
+          </a:xfrm>
+        </p:spPr>
+        <p:txBody>
+          <a:bodyPr/>
+          <a:lstStyle/>
+          <a:p>
+            <a:pPr marL="514350" indent="-514350">
+              <a:buFont typeface="+mj-lt"/>
+              <a:buAutoNum type="arabicPeriod"/>
+            </a:pPr>
+            <a:r>
+              <a:rPr lang="en-US" smtClean="0"/>
+              <a:t>Installation von Core &amp; Http-Loader</a:t>
+            </a:r>
+          </a:p>
+          <a:p>
+            <a:pPr marL="514350" indent="-514350">
+              <a:buFont typeface="+mj-lt"/>
+              <a:buAutoNum type="arabicPeriod"/>
+            </a:pPr>
+            <a:r>
+              <a:rPr lang="en-US" smtClean="0"/>
+              <a:t>Import des Translate-Moduls in den Komponenten des Demo-Moduls</a:t>
+            </a:r>
+          </a:p>
+          <a:p>
+            <a:pPr marL="514350" indent="-514350">
+              <a:buFont typeface="+mj-lt"/>
+              <a:buAutoNum type="arabicPeriod"/>
+            </a:pPr>
+            <a:r>
+              <a:rPr lang="en-US" smtClean="0"/>
+              <a:t>Setup des Translate-Moduls</a:t>
+            </a:r>
+            <a:endParaRPr lang="de-DE"/>
           </a:p>
         </p:txBody>
       </p:sp>
     </p:spTree>
     <p:extLst>
       <p:ext uri="{BB962C8B-B14F-4D97-AF65-F5344CB8AC3E}">
-        <p14:creationId xmlns:p14="http://schemas.microsoft.com/office/powerpoint/2010/main" val="306223021"/>
+        <p14:creationId xmlns:p14="http://schemas.microsoft.com/office/powerpoint/2010/main" val="3013350585"/>
+      </p:ext>
+    </p:extLst>
+  </p:cSld>
+  <p:clrMapOvr>
+    <a:masterClrMapping/>
+  </p:clrMapOvr>
+  <p:timing>
+    <p:tnLst>
+      <p:par>
+        <p:cTn id="1" dur="indefinite" restart="never" nodeType="tmRoot"/>
+      </p:par>
+    </p:tnLst>
+  </p:timing>
+</p:sld>
+</file>
+
+<file path=ppt/slides/slide11.xml><?xml version="1.0" encoding="utf-8"?>
+<p:sld xmlns:a="http://schemas.openxmlformats.org/drawingml/2006/main" xmlns:r="http://schemas.openxmlformats.org/officeDocument/2006/relationships" xmlns:p="http://schemas.openxmlformats.org/presentationml/2006/main">
+  <p:cSld>
+    <p:spTree>
+      <p:nvGrpSpPr>
+        <p:cNvPr id="1" name=""/>
+        <p:cNvGrpSpPr/>
+        <p:nvPr/>
+      </p:nvGrpSpPr>
+      <p:grpSpPr>
+        <a:xfrm>
+          <a:off x="0" y="0"/>
+          <a:ext cx="0" cy="0"/>
+          <a:chOff x="0" y="0"/>
+          <a:chExt cx="0" cy="0"/>
+        </a:xfrm>
+      </p:grpSpPr>
+      <p:sp>
+        <p:nvSpPr>
+          <p:cNvPr id="2" name="Titel 1"/>
+          <p:cNvSpPr>
+            <a:spLocks noGrp="1"/>
+          </p:cNvSpPr>
+          <p:nvPr>
+            <p:ph type="title"/>
+          </p:nvPr>
+        </p:nvSpPr>
+        <p:spPr/>
+        <p:txBody>
+          <a:bodyPr/>
+          <a:lstStyle/>
+          <a:p>
+            <a:r>
+              <a:rPr lang="en-US"/>
+              <a:t>4</a:t>
+            </a:r>
+            <a:r>
+              <a:rPr lang="en-US" smtClean="0"/>
+              <a:t>. Übersetzung</a:t>
+            </a:r>
+            <a:endParaRPr lang="de-DE"/>
+          </a:p>
+        </p:txBody>
+      </p:sp>
+      <p:sp>
+        <p:nvSpPr>
+          <p:cNvPr id="3" name="Inhaltsplatzhalter 2"/>
+          <p:cNvSpPr>
+            <a:spLocks noGrp="1"/>
+          </p:cNvSpPr>
+          <p:nvPr>
+            <p:ph sz="half" idx="1"/>
+          </p:nvPr>
+        </p:nvSpPr>
+        <p:spPr>
+          <a:xfrm>
+            <a:off x="457200" y="1588519"/>
+            <a:ext cx="8229600" cy="3006103"/>
+          </a:xfrm>
+        </p:spPr>
+        <p:txBody>
+          <a:bodyPr>
+            <a:normAutofit fontScale="92500" lnSpcReduction="20000"/>
+          </a:bodyPr>
+          <a:lstStyle/>
+          <a:p>
+            <a:pPr marL="514350" indent="-514350">
+              <a:buFont typeface="+mj-lt"/>
+              <a:buAutoNum type="arabicPeriod"/>
+            </a:pPr>
+            <a:r>
+              <a:rPr lang="en-US" smtClean="0"/>
+              <a:t>Aufbau der Language-Files</a:t>
+            </a:r>
+          </a:p>
+          <a:p>
+            <a:pPr marL="514350" indent="-514350">
+              <a:buFont typeface="+mj-lt"/>
+              <a:buAutoNum type="arabicPeriod"/>
+            </a:pPr>
+            <a:r>
+              <a:rPr lang="en-US" smtClean="0"/>
+              <a:t>Übersetzung mit Pipe und Direktive</a:t>
+            </a:r>
+          </a:p>
+          <a:p>
+            <a:pPr marL="514350" indent="-514350">
+              <a:buFont typeface="+mj-lt"/>
+              <a:buAutoNum type="arabicPeriod"/>
+            </a:pPr>
+            <a:r>
+              <a:rPr lang="en-US" smtClean="0"/>
+              <a:t>Sprachumschaltung</a:t>
+            </a:r>
+          </a:p>
+          <a:p>
+            <a:pPr marL="514350" indent="-514350">
+              <a:buFont typeface="+mj-lt"/>
+              <a:buAutoNum type="arabicPeriod"/>
+            </a:pPr>
+            <a:r>
+              <a:rPr lang="en-US" smtClean="0"/>
+              <a:t>Language-Files aus dem Backend laden</a:t>
+            </a:r>
+          </a:p>
+          <a:p>
+            <a:pPr marL="514350" indent="-514350">
+              <a:buFont typeface="+mj-lt"/>
+              <a:buAutoNum type="arabicPeriod"/>
+            </a:pPr>
+            <a:r>
+              <a:rPr lang="en-US" smtClean="0"/>
+              <a:t>Label-Sprache anzeigen</a:t>
+            </a:r>
+          </a:p>
+          <a:p>
+            <a:pPr marL="514350" indent="-514350">
+              <a:buFont typeface="+mj-lt"/>
+              <a:buAutoNum type="arabicPeriod"/>
+            </a:pPr>
+            <a:r>
+              <a:rPr lang="en-US" smtClean="0"/>
+              <a:t>Übersetzung im TypeScript</a:t>
+            </a:r>
+          </a:p>
+          <a:p>
+            <a:pPr marL="514350" indent="-514350">
+              <a:buFont typeface="+mj-lt"/>
+              <a:buAutoNum type="arabicPeriod"/>
+            </a:pPr>
+            <a:r>
+              <a:rPr lang="en-US" smtClean="0"/>
+              <a:t>Übersetzung innerhalb einer Pipe</a:t>
+            </a:r>
+          </a:p>
+          <a:p>
+            <a:pPr marL="514350" indent="-514350">
+              <a:buFont typeface="+mj-lt"/>
+              <a:buAutoNum type="arabicPeriod"/>
+            </a:pPr>
+            <a:endParaRPr lang="en-US" smtClean="0"/>
+          </a:p>
+        </p:txBody>
+      </p:sp>
+    </p:spTree>
+    <p:extLst>
+      <p:ext uri="{BB962C8B-B14F-4D97-AF65-F5344CB8AC3E}">
+        <p14:creationId xmlns:p14="http://schemas.microsoft.com/office/powerpoint/2010/main" val="2863242881"/>
+      </p:ext>
+    </p:extLst>
+  </p:cSld>
+  <p:clrMapOvr>
+    <a:masterClrMapping/>
+  </p:clrMapOvr>
+  <p:timing>
+    <p:tnLst>
+      <p:par>
+        <p:cTn id="1" dur="indefinite" restart="never" nodeType="tmRoot"/>
+      </p:par>
+    </p:tnLst>
+  </p:timing>
+</p:sld>
+</file>
+
+<file path=ppt/slides/slide12.xml><?xml version="1.0" encoding="utf-8"?>
+<p:sld xmlns:a="http://schemas.openxmlformats.org/drawingml/2006/main" xmlns:r="http://schemas.openxmlformats.org/officeDocument/2006/relationships" xmlns:p="http://schemas.openxmlformats.org/presentationml/2006/main">
+  <p:cSld>
+    <p:spTree>
+      <p:nvGrpSpPr>
+        <p:cNvPr id="1" name=""/>
+        <p:cNvGrpSpPr/>
+        <p:nvPr/>
+      </p:nvGrpSpPr>
+      <p:grpSpPr>
+        <a:xfrm>
+          <a:off x="0" y="0"/>
+          <a:ext cx="0" cy="0"/>
+          <a:chOff x="0" y="0"/>
+          <a:chExt cx="0" cy="0"/>
+        </a:xfrm>
+      </p:grpSpPr>
+      <p:sp>
+        <p:nvSpPr>
+          <p:cNvPr id="2" name="Titel 1"/>
+          <p:cNvSpPr>
+            <a:spLocks noGrp="1"/>
+          </p:cNvSpPr>
+          <p:nvPr>
+            <p:ph type="title"/>
+          </p:nvPr>
+        </p:nvSpPr>
+        <p:spPr/>
+        <p:txBody>
+          <a:bodyPr/>
+          <a:lstStyle/>
+          <a:p>
+            <a:r>
+              <a:rPr lang="en-US"/>
+              <a:t>5</a:t>
+            </a:r>
+            <a:r>
+              <a:rPr lang="en-US" smtClean="0"/>
+              <a:t>. Unit-Tests</a:t>
+            </a:r>
+            <a:endParaRPr lang="de-DE"/>
+          </a:p>
+        </p:txBody>
+      </p:sp>
+      <p:sp>
+        <p:nvSpPr>
+          <p:cNvPr id="3" name="Inhaltsplatzhalter 2"/>
+          <p:cNvSpPr>
+            <a:spLocks noGrp="1"/>
+          </p:cNvSpPr>
+          <p:nvPr>
+            <p:ph sz="half" idx="1"/>
+          </p:nvPr>
+        </p:nvSpPr>
+        <p:spPr>
+          <a:xfrm>
+            <a:off x="457200" y="1588519"/>
+            <a:ext cx="8229600" cy="3006103"/>
+          </a:xfrm>
+        </p:spPr>
+        <p:txBody>
+          <a:bodyPr>
+            <a:normAutofit/>
+          </a:bodyPr>
+          <a:lstStyle/>
+          <a:p>
+            <a:pPr marL="514350" indent="-514350">
+              <a:buFont typeface="+mj-lt"/>
+              <a:buAutoNum type="arabicPeriod"/>
+            </a:pPr>
+            <a:r>
+              <a:rPr lang="en-US" smtClean="0"/>
+              <a:t>Mock des Translate-Service</a:t>
+            </a:r>
+          </a:p>
+          <a:p>
+            <a:pPr marL="514350" indent="-514350">
+              <a:buFont typeface="+mj-lt"/>
+              <a:buAutoNum type="arabicPeriod"/>
+            </a:pPr>
+            <a:r>
+              <a:rPr lang="en-US" smtClean="0"/>
+              <a:t>Mock der Translate-Pipe</a:t>
+            </a:r>
+          </a:p>
+          <a:p>
+            <a:pPr marL="514350" indent="-514350">
+              <a:buFont typeface="+mj-lt"/>
+              <a:buAutoNum type="arabicPeriod"/>
+            </a:pPr>
+            <a:r>
+              <a:rPr lang="en-US" smtClean="0"/>
+              <a:t>Überschreiben des Component-Templates</a:t>
+            </a:r>
+          </a:p>
+          <a:p>
+            <a:pPr marL="514350" indent="-514350">
+              <a:buFont typeface="+mj-lt"/>
+              <a:buAutoNum type="arabicPeriod"/>
+            </a:pPr>
+            <a:endParaRPr lang="en-US" smtClean="0"/>
+          </a:p>
+        </p:txBody>
+      </p:sp>
+    </p:spTree>
+    <p:extLst>
+      <p:ext uri="{BB962C8B-B14F-4D97-AF65-F5344CB8AC3E}">
+        <p14:creationId xmlns:p14="http://schemas.microsoft.com/office/powerpoint/2010/main" val="1503325222"/>
+      </p:ext>
+    </p:extLst>
+  </p:cSld>
+  <p:clrMapOvr>
+    <a:masterClrMapping/>
+  </p:clrMapOvr>
+  <p:timing>
+    <p:tnLst>
+      <p:par>
+        <p:cTn id="1" dur="indefinite" restart="never" nodeType="tmRoot"/>
+      </p:par>
+    </p:tnLst>
+  </p:timing>
+</p:sld>
+</file>
+
+<file path=ppt/slides/slide13.xml><?xml version="1.0" encoding="utf-8"?>
+<p:sld xmlns:a="http://schemas.openxmlformats.org/drawingml/2006/main" xmlns:r="http://schemas.openxmlformats.org/officeDocument/2006/relationships" xmlns:p="http://schemas.openxmlformats.org/presentationml/2006/main">
+  <p:cSld>
+    <p:spTree>
+      <p:nvGrpSpPr>
+        <p:cNvPr id="1" name=""/>
+        <p:cNvGrpSpPr/>
+        <p:nvPr/>
+      </p:nvGrpSpPr>
+      <p:grpSpPr>
+        <a:xfrm>
+          <a:off x="0" y="0"/>
+          <a:ext cx="0" cy="0"/>
+          <a:chOff x="0" y="0"/>
+          <a:chExt cx="0" cy="0"/>
+        </a:xfrm>
+      </p:grpSpPr>
+      <p:sp>
+        <p:nvSpPr>
+          <p:cNvPr id="6" name="Titel 5"/>
+          <p:cNvSpPr>
+            <a:spLocks noGrp="1"/>
+          </p:cNvSpPr>
+          <p:nvPr>
+            <p:ph type="title"/>
+          </p:nvPr>
+        </p:nvSpPr>
+        <p:spPr>
+          <a:xfrm>
+            <a:off x="404948" y="2604667"/>
+            <a:ext cx="8347165" cy="1157436"/>
+          </a:xfrm>
+          <a:prstGeom prst="rect">
+            <a:avLst/>
+          </a:prstGeom>
+        </p:spPr>
+        <p:txBody>
+          <a:bodyPr>
+            <a:normAutofit/>
+          </a:bodyPr>
+          <a:lstStyle/>
+          <a:p>
+            <a:pPr>
+              <a:tabLst>
+                <a:tab pos="358775" algn="l"/>
+                <a:tab pos="719138" algn="l"/>
+              </a:tabLst>
+            </a:pPr>
+            <a:r>
+              <a:rPr lang="en-US" sz="1600" smtClean="0"/>
+              <a:t>Twitter: 	@kingxelor</a:t>
+            </a:r>
+            <a:br>
+              <a:rPr lang="en-US" sz="1600" smtClean="0"/>
+            </a:br>
+            <a:r>
+              <a:rPr lang="en-US" sz="1600"/>
+              <a:t>	</a:t>
+            </a:r>
+            <a:r>
+              <a:rPr lang="en-US" sz="1600" smtClean="0"/>
+              <a:t>	@conplementAG</a:t>
+            </a:r>
+            <a:r>
+              <a:rPr lang="en-US" sz="1600" smtClean="0"/>
+              <a:t/>
+            </a:r>
+            <a:br>
+              <a:rPr lang="en-US" sz="1600" smtClean="0"/>
+            </a:br>
+            <a:r>
+              <a:rPr lang="en-US" sz="1600" smtClean="0"/>
+              <a:t/>
+            </a:r>
+            <a:br>
+              <a:rPr lang="en-US" sz="1600" smtClean="0"/>
+            </a:br>
+            <a:r>
+              <a:rPr lang="en-US" sz="1600" smtClean="0"/>
+              <a:t>Email: matthias.drescher@conplement.de</a:t>
+            </a:r>
+            <a:endParaRPr lang="de-DE" sz="1600" dirty="0"/>
+          </a:p>
+        </p:txBody>
+      </p:sp>
+      <p:sp>
+        <p:nvSpPr>
+          <p:cNvPr id="3" name="Titel 5"/>
+          <p:cNvSpPr txBox="1">
+            <a:spLocks/>
+          </p:cNvSpPr>
+          <p:nvPr/>
+        </p:nvSpPr>
+        <p:spPr>
+          <a:xfrm>
+            <a:off x="393268" y="971610"/>
+            <a:ext cx="7408641" cy="1613462"/>
+          </a:xfrm>
+          <a:prstGeom prst="rect">
+            <a:avLst/>
+          </a:prstGeom>
+        </p:spPr>
+        <p:txBody>
+          <a:bodyPr vert="horz" lIns="91440" tIns="45720" rIns="91440" bIns="45720" rtlCol="0" anchor="ctr">
+            <a:normAutofit fontScale="97500"/>
+          </a:bodyPr>
+          <a:lstStyle>
+            <a:lvl1pPr algn="l" defTabSz="457200" rtl="0" eaLnBrk="1" latinLnBrk="0" hangingPunct="1">
+              <a:spcBef>
+                <a:spcPct val="0"/>
+              </a:spcBef>
+              <a:buNone/>
+              <a:defRPr sz="3200" b="0" i="0" kern="1200">
+                <a:solidFill>
+                  <a:srgbClr val="FFFFFF"/>
+                </a:solidFill>
+                <a:latin typeface="+mn-lt"/>
+                <a:ea typeface="+mj-ea"/>
+                <a:cs typeface="Neo Sans W1G Medium"/>
+              </a:defRPr>
+            </a:lvl1pPr>
+          </a:lstStyle>
+          <a:p>
+            <a:r>
+              <a:rPr lang="de-DE" sz="4400" smtClean="0"/>
+              <a:t>Code auf GitHub:</a:t>
+            </a:r>
+            <a:br>
+              <a:rPr lang="de-DE" sz="4400" smtClean="0"/>
+            </a:br>
+            <a:r>
+              <a:rPr lang="de-DE" sz="2400" smtClean="0">
+                <a:hlinkClick r:id="rId2"/>
+              </a:rPr>
+              <a:t>https://github.com/bytePassion/wdc_Talk_ngx-translate</a:t>
+            </a:r>
+            <a:r>
+              <a:rPr lang="de-DE" sz="2400" smtClean="0"/>
+              <a:t> </a:t>
+            </a:r>
+            <a:endParaRPr lang="de-DE" sz="2400" dirty="0"/>
+          </a:p>
+        </p:txBody>
+      </p:sp>
+      <p:sp>
+        <p:nvSpPr>
+          <p:cNvPr id="4" name="Titel 5"/>
+          <p:cNvSpPr txBox="1">
+            <a:spLocks/>
+          </p:cNvSpPr>
+          <p:nvPr/>
+        </p:nvSpPr>
+        <p:spPr>
+          <a:xfrm>
+            <a:off x="4990013" y="2942008"/>
+            <a:ext cx="3279776" cy="1679380"/>
+          </a:xfrm>
+          <a:prstGeom prst="rect">
+            <a:avLst/>
+          </a:prstGeom>
+        </p:spPr>
+        <p:txBody>
+          <a:bodyPr vert="horz" lIns="91440" tIns="45720" rIns="91440" bIns="45720" rtlCol="0" anchor="ctr">
+            <a:normAutofit fontScale="97500"/>
+          </a:bodyPr>
+          <a:lstStyle>
+            <a:lvl1pPr algn="l" defTabSz="457200" rtl="0" eaLnBrk="1" latinLnBrk="0" hangingPunct="1">
+              <a:spcBef>
+                <a:spcPct val="0"/>
+              </a:spcBef>
+              <a:buNone/>
+              <a:defRPr sz="3200" b="0" i="0" kern="1200">
+                <a:solidFill>
+                  <a:srgbClr val="FFFFFF"/>
+                </a:solidFill>
+                <a:latin typeface="+mn-lt"/>
+                <a:ea typeface="+mj-ea"/>
+                <a:cs typeface="Neo Sans W1G Medium"/>
+              </a:defRPr>
+            </a:lvl1pPr>
+          </a:lstStyle>
+          <a:p>
+            <a:r>
+              <a:rPr lang="de-DE" sz="6000" smtClean="0"/>
+              <a:t>Fragen?</a:t>
+            </a:r>
+            <a:endParaRPr lang="de-DE" sz="6000" dirty="0"/>
+          </a:p>
+        </p:txBody>
+      </p:sp>
+    </p:spTree>
+    <p:extLst>
+      <p:ext uri="{BB962C8B-B14F-4D97-AF65-F5344CB8AC3E}">
+        <p14:creationId xmlns:p14="http://schemas.microsoft.com/office/powerpoint/2010/main" val="2467387264"/>
+      </p:ext>
+    </p:extLst>
+  </p:cSld>
+  <p:clrMapOvr>
+    <a:masterClrMapping/>
+  </p:clrMapOvr>
+  <p:timing>
+    <p:tnLst>
+      <p:par>
+        <p:cTn id="1" dur="indefinite" restart="never" nodeType="tmRoot"/>
+      </p:par>
+    </p:tnLst>
+  </p:timing>
+</p:sld>
+</file>
+
+<file path=ppt/slides/slide14.xml><?xml version="1.0" encoding="utf-8"?>
+<p:sld xmlns:a="http://schemas.openxmlformats.org/drawingml/2006/main" xmlns:r="http://schemas.openxmlformats.org/officeDocument/2006/relationships" xmlns:p="http://schemas.openxmlformats.org/presentationml/2006/main">
+  <p:cSld>
+    <p:spTree>
+      <p:nvGrpSpPr>
+        <p:cNvPr id="1" name=""/>
+        <p:cNvGrpSpPr/>
+        <p:nvPr/>
+      </p:nvGrpSpPr>
+      <p:grpSpPr>
+        <a:xfrm>
+          <a:off x="0" y="0"/>
+          <a:ext cx="0" cy="0"/>
+          <a:chOff x="0" y="0"/>
+          <a:chExt cx="0" cy="0"/>
+        </a:xfrm>
+      </p:grpSpPr>
+    </p:spTree>
+    <p:extLst>
+      <p:ext uri="{BB962C8B-B14F-4D97-AF65-F5344CB8AC3E}">
+        <p14:creationId xmlns:p14="http://schemas.microsoft.com/office/powerpoint/2010/main" val="1402815080"/>
       </p:ext>
     </p:extLst>
   </p:cSld>
@@ -1939,7 +2577,7 @@
       </p:grpSpPr>
       <p:sp>
         <p:nvSpPr>
-          <p:cNvPr id="6" name="Titel 5"/>
+          <p:cNvPr id="7" name="Titel 6"/>
           <p:cNvSpPr>
             <a:spLocks noGrp="1"/>
           </p:cNvSpPr>
@@ -1947,70 +2585,23 @@
             <p:ph type="title"/>
           </p:nvPr>
         </p:nvSpPr>
-        <p:spPr>
-          <a:xfrm>
-            <a:off x="3566160" y="1329621"/>
-            <a:ext cx="5120639" cy="1857715"/>
-          </a:xfrm>
-          <a:prstGeom prst="rect">
-            <a:avLst/>
-          </a:prstGeom>
-        </p:spPr>
-        <p:txBody>
-          <a:bodyPr>
-            <a:normAutofit/>
-          </a:bodyPr>
+        <p:spPr/>
+        <p:txBody>
+          <a:bodyPr/>
           <a:lstStyle/>
           <a:p>
             <a:r>
-              <a:rPr lang="de-DE" smtClean="0"/>
-              <a:t>Matthias Drescher</a:t>
-            </a:r>
-            <a:br>
-              <a:rPr lang="de-DE" smtClean="0"/>
-            </a:br>
-            <a:r>
-              <a:rPr lang="de-DE" sz="1600" smtClean="0"/>
-              <a:t>Software Engineer/ Scrum Master</a:t>
-            </a:r>
-            <a:endParaRPr lang="de-DE" sz="1600" dirty="0"/>
-          </a:p>
-        </p:txBody>
-      </p:sp>
-      <p:pic>
-        <p:nvPicPr>
-          <p:cNvPr id="3" name="Grafik 2"/>
-          <p:cNvPicPr>
-            <a:picLocks noChangeAspect="1"/>
-          </p:cNvPicPr>
-          <p:nvPr/>
-        </p:nvPicPr>
-        <p:blipFill>
-          <a:blip r:embed="rId2">
-            <a:extLst>
-              <a:ext uri="{28A0092B-C50C-407E-A947-70E740481C1C}">
-                <a14:useLocalDpi xmlns:a14="http://schemas.microsoft.com/office/drawing/2010/main" val="0"/>
-              </a:ext>
-            </a:extLst>
-          </a:blip>
-          <a:stretch>
-            <a:fillRect/>
-          </a:stretch>
-        </p:blipFill>
-        <p:spPr>
-          <a:xfrm>
-            <a:off x="380212" y="1125284"/>
-            <a:ext cx="3323107" cy="3463520"/>
-          </a:xfrm>
-          <a:prstGeom prst="rect">
-            <a:avLst/>
-          </a:prstGeom>
-        </p:spPr>
-      </p:pic>
+              <a:rPr lang="en-US" smtClean="0"/>
+              <a:t>‘wdc.talk.page1.title’</a:t>
+            </a:r>
+            <a:endParaRPr lang="de-DE" dirty="0"/>
+          </a:p>
+        </p:txBody>
+      </p:sp>
     </p:spTree>
     <p:extLst>
       <p:ext uri="{BB962C8B-B14F-4D97-AF65-F5344CB8AC3E}">
-        <p14:creationId xmlns:p14="http://schemas.microsoft.com/office/powerpoint/2010/main" val="2025083326"/>
+        <p14:creationId xmlns:p14="http://schemas.microsoft.com/office/powerpoint/2010/main" val="2899942526"/>
       </p:ext>
     </p:extLst>
   </p:cSld>
@@ -2046,7 +2637,7 @@
       </p:grpSpPr>
       <p:sp>
         <p:nvSpPr>
-          <p:cNvPr id="4" name="Titel 3"/>
+          <p:cNvPr id="7" name="Titel 6"/>
           <p:cNvSpPr>
             <a:spLocks noGrp="1"/>
           </p:cNvSpPr>
@@ -2060,226 +2651,47 @@
           <a:lstStyle/>
           <a:p>
             <a:r>
-              <a:rPr lang="de-DE" dirty="0" smtClean="0"/>
-              <a:t>Agenda</a:t>
+              <a:rPr lang="en-US" smtClean="0"/>
+              <a:t>‘wdc.talk.page1.title’</a:t>
             </a:r>
             <a:endParaRPr lang="de-DE" dirty="0"/>
           </a:p>
         </p:txBody>
       </p:sp>
-      <p:sp>
-        <p:nvSpPr>
-          <p:cNvPr id="7" name="Inhaltsplatzhalter 6"/>
-          <p:cNvSpPr>
-            <a:spLocks noGrp="1"/>
-          </p:cNvSpPr>
-          <p:nvPr>
-            <p:ph idx="1"/>
-          </p:nvPr>
-        </p:nvSpPr>
-        <p:spPr>
-          <a:xfrm>
-            <a:off x="457200" y="1363437"/>
-            <a:ext cx="4310743" cy="3394472"/>
-          </a:xfrm>
-        </p:spPr>
-        <p:txBody>
-          <a:bodyPr>
-            <a:normAutofit fontScale="55000" lnSpcReduction="20000"/>
-          </a:bodyPr>
-          <a:lstStyle/>
-          <a:p>
-            <a:pPr marL="358775" indent="-358775">
-              <a:buFont typeface="+mj-lt"/>
-              <a:buAutoNum type="arabicPeriod"/>
-            </a:pPr>
-            <a:r>
-              <a:rPr lang="de-DE" smtClean="0"/>
-              <a:t>Vorstellung </a:t>
-            </a:r>
-            <a:r>
-              <a:rPr lang="de-DE"/>
-              <a:t>des Demo-Projekts</a:t>
-            </a:r>
-          </a:p>
-          <a:p>
-            <a:pPr marL="358775" indent="-358775">
-              <a:buFont typeface="+mj-lt"/>
-              <a:buAutoNum type="arabicPeriod"/>
-            </a:pPr>
-            <a:r>
-              <a:rPr lang="de-DE" smtClean="0"/>
-              <a:t>Format </a:t>
-            </a:r>
-            <a:r>
-              <a:rPr lang="de-DE"/>
-              <a:t>der Sprachdatei</a:t>
-            </a:r>
-          </a:p>
-          <a:p>
-            <a:pPr marL="358775" indent="-358775">
-              <a:buFont typeface="+mj-lt"/>
-              <a:buAutoNum type="arabicPeriod"/>
-            </a:pPr>
-            <a:r>
-              <a:rPr lang="de-DE" smtClean="0"/>
-              <a:t>Installierung </a:t>
-            </a:r>
-            <a:r>
-              <a:rPr lang="de-DE"/>
-              <a:t>von ngx-translate</a:t>
-            </a:r>
-          </a:p>
-          <a:p>
-            <a:pPr marL="358775" indent="-358775">
-              <a:buFont typeface="+mj-lt"/>
-              <a:buAutoNum type="arabicPeriod"/>
-            </a:pPr>
-            <a:r>
-              <a:rPr lang="de-DE" smtClean="0"/>
-              <a:t>Vorbereitungen </a:t>
-            </a:r>
-            <a:r>
-              <a:rPr lang="de-DE"/>
-              <a:t>zur Verwendung</a:t>
-            </a:r>
-          </a:p>
-          <a:p>
-            <a:pPr marL="358775" indent="-358775">
-              <a:buFont typeface="+mj-lt"/>
-              <a:buAutoNum type="arabicPeriod"/>
-            </a:pPr>
-            <a:r>
-              <a:rPr lang="de-DE" smtClean="0"/>
-              <a:t>Übersetzungen </a:t>
-            </a:r>
-            <a:r>
-              <a:rPr lang="de-DE"/>
-              <a:t>mit Pipe </a:t>
-            </a:r>
-            <a:r>
-              <a:rPr lang="de-DE" smtClean="0"/>
-              <a:t>und Direktive</a:t>
-            </a:r>
-          </a:p>
-          <a:p>
-            <a:pPr marL="358775" indent="-358775">
-              <a:buFont typeface="+mj-lt"/>
-              <a:buAutoNum type="arabicPeriod"/>
-            </a:pPr>
-            <a:r>
-              <a:rPr lang="de-DE" smtClean="0"/>
-              <a:t>Sprachumschaltung</a:t>
-            </a:r>
-            <a:endParaRPr lang="de-DE"/>
-          </a:p>
-          <a:p>
-            <a:pPr marL="358775" indent="-358775">
-              <a:buFont typeface="+mj-lt"/>
-              <a:buAutoNum type="arabicPeriod"/>
-            </a:pPr>
-            <a:r>
-              <a:rPr lang="de-DE" smtClean="0"/>
-              <a:t>Sprachdateien </a:t>
-            </a:r>
-            <a:r>
-              <a:rPr lang="de-DE"/>
-              <a:t>aus dem Backend laden</a:t>
-            </a:r>
-          </a:p>
-          <a:p>
-            <a:pPr marL="358775" indent="-358775">
-              <a:buFont typeface="+mj-lt"/>
-              <a:buAutoNum type="arabicPeriod"/>
-            </a:pPr>
-            <a:r>
-              <a:rPr lang="de-DE" smtClean="0"/>
-              <a:t>„Labelsprache“ </a:t>
-            </a:r>
-            <a:r>
-              <a:rPr lang="de-DE"/>
-              <a:t>anzeigen</a:t>
-            </a:r>
-          </a:p>
-          <a:p>
-            <a:pPr marL="358775" indent="-358775">
-              <a:buFont typeface="+mj-lt"/>
-              <a:buAutoNum type="arabicPeriod"/>
-            </a:pPr>
-            <a:r>
-              <a:rPr lang="de-DE" smtClean="0"/>
-              <a:t>Übersetzung </a:t>
-            </a:r>
-            <a:r>
-              <a:rPr lang="de-DE"/>
-              <a:t>im TypeScript</a:t>
-            </a:r>
-          </a:p>
-          <a:p>
-            <a:pPr marL="358775" indent="-358775">
-              <a:buFont typeface="+mj-lt"/>
-              <a:buAutoNum type="arabicPeriod"/>
-            </a:pPr>
-            <a:r>
-              <a:rPr lang="de-DE" smtClean="0"/>
-              <a:t>Übersetzung </a:t>
-            </a:r>
-            <a:r>
-              <a:rPr lang="de-DE"/>
-              <a:t>mit </a:t>
-            </a:r>
-            <a:r>
-              <a:rPr lang="de-DE" smtClean="0"/>
-              <a:t>Parameter</a:t>
-            </a:r>
-            <a:endParaRPr lang="de-DE"/>
-          </a:p>
-          <a:p>
-            <a:pPr marL="358775" indent="-358775">
-              <a:buFont typeface="+mj-lt"/>
-              <a:buAutoNum type="arabicPeriod"/>
-            </a:pPr>
-            <a:r>
-              <a:rPr lang="de-DE" smtClean="0"/>
-              <a:t>In </a:t>
-            </a:r>
-            <a:r>
-              <a:rPr lang="de-DE"/>
-              <a:t>der Pipe auf Übersetzung reagieren</a:t>
-            </a:r>
-          </a:p>
-          <a:p>
-            <a:pPr marL="358775" indent="-358775">
-              <a:buFont typeface="+mj-lt"/>
-              <a:buAutoNum type="arabicPeriod"/>
-            </a:pPr>
-            <a:r>
-              <a:rPr lang="de-DE" smtClean="0"/>
-              <a:t>Unit-testing</a:t>
-            </a:r>
-            <a:endParaRPr lang="de-DE"/>
-          </a:p>
-          <a:p>
-            <a:pPr marL="358775" indent="-358775">
-              <a:buFont typeface="+mj-lt"/>
-              <a:buAutoNum type="arabicPeriod"/>
-            </a:pPr>
-            <a:r>
-              <a:rPr lang="de-DE" smtClean="0"/>
-              <a:t>Sprache </a:t>
-            </a:r>
-            <a:r>
-              <a:rPr lang="de-DE"/>
-              <a:t>aus dem Browser auslesen</a:t>
-            </a:r>
-            <a:endParaRPr lang="de-DE" dirty="0"/>
-          </a:p>
-        </p:txBody>
-      </p:sp>
+      <p:pic>
+        <p:nvPicPr>
+          <p:cNvPr id="3" name="Grafik 2"/>
+          <p:cNvPicPr>
+            <a:picLocks noChangeAspect="1"/>
+          </p:cNvPicPr>
+          <p:nvPr/>
+        </p:nvPicPr>
+        <p:blipFill>
+          <a:blip r:embed="rId2">
+            <a:extLst>
+              <a:ext uri="{28A0092B-C50C-407E-A947-70E740481C1C}">
+                <a14:useLocalDpi xmlns:a14="http://schemas.microsoft.com/office/drawing/2010/main" val="0"/>
+              </a:ext>
+            </a:extLst>
+          </a:blip>
+          <a:stretch>
+            <a:fillRect/>
+          </a:stretch>
+        </p:blipFill>
+        <p:spPr>
+          <a:xfrm>
+            <a:off x="0" y="3367129"/>
+            <a:ext cx="9144000" cy="1805560"/>
+          </a:xfrm>
+          <a:prstGeom prst="rect">
+            <a:avLst/>
+          </a:prstGeom>
+        </p:spPr>
+      </p:pic>
     </p:spTree>
     <p:extLst>
       <p:ext uri="{BB962C8B-B14F-4D97-AF65-F5344CB8AC3E}">
-        <p14:creationId xmlns:p14="http://schemas.microsoft.com/office/powerpoint/2010/main" val="649067111"/>
+        <p14:creationId xmlns:p14="http://schemas.microsoft.com/office/powerpoint/2010/main" val="1051800377"/>
       </p:ext>
     </p:extLst>
   </p:cSld>
@@ -2315,7 +2727,7 @@
       </p:grpSpPr>
       <p:sp>
         <p:nvSpPr>
-          <p:cNvPr id="6" name="Titel 5"/>
+          <p:cNvPr id="7" name="Titel 6"/>
           <p:cNvSpPr>
             <a:spLocks noGrp="1"/>
           </p:cNvSpPr>
@@ -2323,30 +2735,23 @@
             <p:ph type="title"/>
           </p:nvPr>
         </p:nvSpPr>
-        <p:spPr>
-          <a:xfrm>
-            <a:off x="2870014" y="1677043"/>
-            <a:ext cx="3277157" cy="1613462"/>
-          </a:xfrm>
-        </p:spPr>
-        <p:txBody>
-          <a:bodyPr>
-            <a:normAutofit/>
-          </a:bodyPr>
+        <p:spPr/>
+        <p:txBody>
+          <a:bodyPr/>
           <a:lstStyle/>
           <a:p>
             <a:r>
-              <a:rPr lang="de-DE" sz="4800" smtClean="0"/>
-              <a:t>LIVE-DEMO</a:t>
-            </a:r>
-            <a:endParaRPr lang="de-DE" sz="4800" dirty="0"/>
+              <a:rPr lang="de-DE" smtClean="0"/>
+              <a:t>Lokalisierung in Angular (mit ngx-translate)</a:t>
+            </a:r>
+            <a:endParaRPr lang="de-DE" dirty="0"/>
           </a:p>
         </p:txBody>
       </p:sp>
     </p:spTree>
     <p:extLst>
       <p:ext uri="{BB962C8B-B14F-4D97-AF65-F5344CB8AC3E}">
-        <p14:creationId xmlns:p14="http://schemas.microsoft.com/office/powerpoint/2010/main" val="42191938"/>
+        <p14:creationId xmlns:p14="http://schemas.microsoft.com/office/powerpoint/2010/main" val="361846859"/>
       </p:ext>
     </p:extLst>
   </p:cSld>
@@ -2392,47 +2797,68 @@
         </p:nvSpPr>
         <p:spPr>
           <a:xfrm>
-            <a:off x="674120" y="1056319"/>
-            <a:ext cx="7408641" cy="1613462"/>
-          </a:xfrm>
+            <a:off x="3566160" y="1329621"/>
+            <a:ext cx="5120639" cy="1857715"/>
+          </a:xfrm>
+          <a:prstGeom prst="rect">
+            <a:avLst/>
+          </a:prstGeom>
         </p:spPr>
         <p:txBody>
           <a:bodyPr>
-            <a:normAutofit fontScale="90000"/>
+            <a:normAutofit/>
           </a:bodyPr>
           <a:lstStyle/>
           <a:p>
             <a:r>
-              <a:rPr lang="de-DE" sz="4800"/>
-              <a:t>Code auf GitHub:</a:t>
+              <a:rPr lang="de-DE" smtClean="0"/>
+              <a:t>Matthias Drescher</a:t>
             </a:r>
             <a:br>
-              <a:rPr lang="de-DE" sz="4800"/>
+              <a:rPr lang="de-DE" smtClean="0"/>
             </a:br>
             <a:r>
-              <a:rPr lang="de-DE" sz="2700">
-                <a:hlinkClick r:id="rId2"/>
-              </a:rPr>
-              <a:t>https://</a:t>
-            </a:r>
-            <a:r>
-              <a:rPr lang="de-DE" sz="2700" smtClean="0">
-                <a:hlinkClick r:id="rId2"/>
-              </a:rPr>
-              <a:t>github.com/bytePassion/wdc_Talk_ngx-translate</a:t>
-            </a:r>
-            <a:r>
-              <a:rPr lang="de-DE" sz="2700" smtClean="0"/>
-              <a:t> </a:t>
-            </a:r>
-            <a:endParaRPr lang="de-DE" sz="2700" dirty="0"/>
-          </a:p>
-        </p:txBody>
-      </p:sp>
+              <a:rPr lang="de-DE" sz="1600" smtClean="0"/>
+              <a:t>Software Engineer/ Scrum Master</a:t>
+            </a:r>
+            <a:endParaRPr lang="de-DE" sz="1600" dirty="0"/>
+          </a:p>
+        </p:txBody>
+      </p:sp>
+      <p:pic>
+        <p:nvPicPr>
+          <p:cNvPr id="3" name="Grafik 2"/>
+          <p:cNvPicPr>
+            <a:picLocks noChangeAspect="1"/>
+          </p:cNvPicPr>
+          <p:nvPr/>
+        </p:nvPicPr>
+        <p:blipFill>
+          <a:blip r:embed="rId2">
+            <a:extLst>
+              <a:ext uri="{28A0092B-C50C-407E-A947-70E740481C1C}">
+                <a14:useLocalDpi xmlns:a14="http://schemas.microsoft.com/office/drawing/2010/main" val="0"/>
+              </a:ext>
+            </a:extLst>
+          </a:blip>
+          <a:stretch>
+            <a:fillRect/>
+          </a:stretch>
+        </p:blipFill>
+        <p:spPr>
+          <a:xfrm>
+            <a:off x="380212" y="1125284"/>
+            <a:ext cx="3323107" cy="3463520"/>
+          </a:xfrm>
+          <a:prstGeom prst="rect">
+            <a:avLst/>
+          </a:prstGeom>
+        </p:spPr>
+      </p:pic>
     </p:spTree>
     <p:extLst>
       <p:ext uri="{BB962C8B-B14F-4D97-AF65-F5344CB8AC3E}">
-        <p14:creationId xmlns:p14="http://schemas.microsoft.com/office/powerpoint/2010/main" val="368199686"/>
+        <p14:creationId xmlns:p14="http://schemas.microsoft.com/office/powerpoint/2010/main" val="2025083326"/>
       </p:ext>
     </p:extLst>
   </p:cSld>
@@ -2468,7 +2894,7 @@
       </p:grpSpPr>
       <p:sp>
         <p:nvSpPr>
-          <p:cNvPr id="6" name="Titel 5"/>
+          <p:cNvPr id="4" name="Titel 3"/>
           <p:cNvSpPr>
             <a:spLocks noGrp="1"/>
           </p:cNvSpPr>
@@ -2476,14 +2902,34 @@
             <p:ph type="title"/>
           </p:nvPr>
         </p:nvSpPr>
-        <p:spPr>
-          <a:xfrm>
-            <a:off x="339634" y="1329621"/>
-            <a:ext cx="8347165" cy="2674145"/>
-          </a:xfrm>
-          <a:prstGeom prst="rect">
-            <a:avLst/>
-          </a:prstGeom>
+        <p:spPr/>
+        <p:txBody>
+          <a:bodyPr/>
+          <a:lstStyle/>
+          <a:p>
+            <a:r>
+              <a:rPr lang="de-DE" dirty="0" smtClean="0"/>
+              <a:t>Agenda</a:t>
+            </a:r>
+            <a:endParaRPr lang="de-DE" dirty="0"/>
+          </a:p>
+        </p:txBody>
+      </p:sp>
+      <p:sp>
+        <p:nvSpPr>
+          <p:cNvPr id="7" name="Inhaltsplatzhalter 6"/>
+          <p:cNvSpPr>
+            <a:spLocks noGrp="1"/>
+          </p:cNvSpPr>
+          <p:nvPr>
+            <p:ph idx="1"/>
+          </p:nvPr>
+        </p:nvSpPr>
+        <p:spPr>
+          <a:xfrm>
+            <a:off x="457200" y="1363437"/>
+            <a:ext cx="5989320" cy="3394472"/>
+          </a:xfrm>
         </p:spPr>
         <p:txBody>
           <a:bodyPr>
@@ -2491,33 +2937,62 @@
           </a:bodyPr>
           <a:lstStyle/>
           <a:p>
-            <a:pPr algn="ctr"/>
+            <a:pPr marL="358775" indent="-358775">
+              <a:buFont typeface="+mj-lt"/>
+              <a:buAutoNum type="arabicPeriod"/>
+            </a:pPr>
             <a:r>
               <a:rPr lang="en-US" smtClean="0"/>
-              <a:t>Vielen Dank für die Aufmerksamkeit!</a:t>
-            </a:r>
-            <a:br>
+              <a:t>Vorstellung des Demo-Projekts</a:t>
+            </a:r>
+          </a:p>
+          <a:p>
+            <a:pPr marL="358775" indent="-358775">
+              <a:buFont typeface="+mj-lt"/>
+              <a:buAutoNum type="arabicPeriod"/>
+            </a:pPr>
+            <a:r>
               <a:rPr lang="en-US" smtClean="0"/>
-            </a:br>
-            <a:r>
-              <a:rPr lang="en-US"/>
-              <a:t/>
-            </a:r>
-            <a:br>
-              <a:rPr lang="en-US"/>
-            </a:br>
+              <a:t>Übersicht über ngx-translate</a:t>
+            </a:r>
+          </a:p>
+          <a:p>
+            <a:pPr marL="358775" indent="-358775">
+              <a:buFont typeface="+mj-lt"/>
+              <a:buAutoNum type="arabicPeriod"/>
+            </a:pPr>
             <a:r>
               <a:rPr lang="en-US" smtClean="0"/>
-              <a:t>Fragen?</a:t>
-            </a:r>
-            <a:endParaRPr lang="de-DE" sz="1600" dirty="0"/>
+              <a:t>Installation &amp; Setup</a:t>
+            </a:r>
+          </a:p>
+          <a:p>
+            <a:pPr marL="358775" indent="-358775">
+              <a:buFont typeface="+mj-lt"/>
+              <a:buAutoNum type="arabicPeriod"/>
+            </a:pPr>
+            <a:r>
+              <a:rPr lang="en-US" smtClean="0"/>
+              <a:t>Übersetzung</a:t>
+            </a:r>
+          </a:p>
+          <a:p>
+            <a:pPr marL="358775" indent="-358775">
+              <a:buFont typeface="+mj-lt"/>
+              <a:buAutoNum type="arabicPeriod"/>
+            </a:pPr>
+            <a:r>
+              <a:rPr lang="en-US" smtClean="0"/>
+              <a:t>Unit-Tests</a:t>
+            </a:r>
+            <a:endParaRPr lang="de-DE" dirty="0"/>
           </a:p>
         </p:txBody>
       </p:sp>
     </p:spTree>
     <p:extLst>
       <p:ext uri="{BB962C8B-B14F-4D97-AF65-F5344CB8AC3E}">
-        <p14:creationId xmlns:p14="http://schemas.microsoft.com/office/powerpoint/2010/main" val="2467387264"/>
+        <p14:creationId xmlns:p14="http://schemas.microsoft.com/office/powerpoint/2010/main" val="649067111"/>
       </p:ext>
     </p:extLst>
   </p:cSld>
@@ -2551,10 +3026,1357 @@
           <a:chExt cx="0" cy="0"/>
         </a:xfrm>
       </p:grpSpPr>
+      <p:sp>
+        <p:nvSpPr>
+          <p:cNvPr id="2" name="Titel 1"/>
+          <p:cNvSpPr>
+            <a:spLocks noGrp="1"/>
+          </p:cNvSpPr>
+          <p:nvPr>
+            <p:ph type="title"/>
+          </p:nvPr>
+        </p:nvSpPr>
+        <p:spPr/>
+        <p:txBody>
+          <a:bodyPr/>
+          <a:lstStyle/>
+          <a:p>
+            <a:r>
+              <a:rPr lang="en-US" smtClean="0"/>
+              <a:t>1. Demo-Projekt</a:t>
+            </a:r>
+            <a:endParaRPr lang="de-DE"/>
+          </a:p>
+        </p:txBody>
+      </p:sp>
+      <p:sp>
+        <p:nvSpPr>
+          <p:cNvPr id="7" name="Abgerundetes Rechteck 6"/>
+          <p:cNvSpPr/>
+          <p:nvPr/>
+        </p:nvSpPr>
+        <p:spPr>
+          <a:xfrm>
+            <a:off x="1735359" y="1121781"/>
+            <a:ext cx="2242616" cy="720379"/>
+          </a:xfrm>
+          <a:prstGeom prst="roundRect">
+            <a:avLst/>
+          </a:prstGeom>
+        </p:spPr>
+        <p:style>
+          <a:lnRef idx="1">
+            <a:schemeClr val="accent3"/>
+          </a:lnRef>
+          <a:fillRef idx="3">
+            <a:schemeClr val="accent3"/>
+          </a:fillRef>
+          <a:effectRef idx="2">
+            <a:schemeClr val="accent3"/>
+          </a:effectRef>
+          <a:fontRef idx="minor">
+            <a:schemeClr val="lt1"/>
+          </a:fontRef>
+        </p:style>
+        <p:txBody>
+          <a:bodyPr rtlCol="0" anchor="ctr"/>
+          <a:lstStyle/>
+          <a:p>
+            <a:pPr algn="ctr"/>
+            <a:r>
+              <a:rPr lang="en-US" smtClean="0">
+                <a:solidFill>
+                  <a:schemeClr val="tx1"/>
+                </a:solidFill>
+              </a:rPr>
+              <a:t>App-Module</a:t>
+            </a:r>
+            <a:endParaRPr lang="de-DE">
+              <a:solidFill>
+                <a:schemeClr val="tx1"/>
+              </a:solidFill>
+            </a:endParaRPr>
+          </a:p>
+        </p:txBody>
+      </p:sp>
+      <p:sp>
+        <p:nvSpPr>
+          <p:cNvPr id="8" name="Abgerundetes Rechteck 7"/>
+          <p:cNvSpPr/>
+          <p:nvPr/>
+        </p:nvSpPr>
+        <p:spPr>
+          <a:xfrm>
+            <a:off x="2334947" y="1994560"/>
+            <a:ext cx="2242616" cy="720379"/>
+          </a:xfrm>
+          <a:prstGeom prst="roundRect">
+            <a:avLst/>
+          </a:prstGeom>
+        </p:spPr>
+        <p:style>
+          <a:lnRef idx="1">
+            <a:schemeClr val="accent3"/>
+          </a:lnRef>
+          <a:fillRef idx="3">
+            <a:schemeClr val="accent3"/>
+          </a:fillRef>
+          <a:effectRef idx="2">
+            <a:schemeClr val="accent3"/>
+          </a:effectRef>
+          <a:fontRef idx="minor">
+            <a:schemeClr val="lt1"/>
+          </a:fontRef>
+        </p:style>
+        <p:txBody>
+          <a:bodyPr rtlCol="0" anchor="ctr"/>
+          <a:lstStyle/>
+          <a:p>
+            <a:pPr algn="ctr"/>
+            <a:r>
+              <a:rPr lang="en-US" smtClean="0">
+                <a:solidFill>
+                  <a:schemeClr val="tx1"/>
+                </a:solidFill>
+              </a:rPr>
+              <a:t>Home-Module</a:t>
+            </a:r>
+            <a:endParaRPr lang="de-DE">
+              <a:solidFill>
+                <a:schemeClr val="tx1"/>
+              </a:solidFill>
+            </a:endParaRPr>
+          </a:p>
+        </p:txBody>
+      </p:sp>
+      <p:sp>
+        <p:nvSpPr>
+          <p:cNvPr id="9" name="Abgerundetes Rechteck 8"/>
+          <p:cNvSpPr/>
+          <p:nvPr/>
+        </p:nvSpPr>
+        <p:spPr>
+          <a:xfrm>
+            <a:off x="2348296" y="2867339"/>
+            <a:ext cx="2242616" cy="720379"/>
+          </a:xfrm>
+          <a:prstGeom prst="roundRect">
+            <a:avLst/>
+          </a:prstGeom>
+        </p:spPr>
+        <p:style>
+          <a:lnRef idx="1">
+            <a:schemeClr val="accent3"/>
+          </a:lnRef>
+          <a:fillRef idx="3">
+            <a:schemeClr val="accent3"/>
+          </a:fillRef>
+          <a:effectRef idx="2">
+            <a:schemeClr val="accent3"/>
+          </a:effectRef>
+          <a:fontRef idx="minor">
+            <a:schemeClr val="lt1"/>
+          </a:fontRef>
+        </p:style>
+        <p:txBody>
+          <a:bodyPr rtlCol="0" anchor="ctr"/>
+          <a:lstStyle/>
+          <a:p>
+            <a:pPr algn="ctr"/>
+            <a:r>
+              <a:rPr lang="en-US" smtClean="0">
+                <a:solidFill>
+                  <a:schemeClr val="tx1"/>
+                </a:solidFill>
+              </a:rPr>
+              <a:t>Pages-Module</a:t>
+            </a:r>
+            <a:endParaRPr lang="de-DE">
+              <a:solidFill>
+                <a:schemeClr val="tx1"/>
+              </a:solidFill>
+            </a:endParaRPr>
+          </a:p>
+        </p:txBody>
+      </p:sp>
     </p:spTree>
     <p:extLst>
       <p:ext uri="{BB962C8B-B14F-4D97-AF65-F5344CB8AC3E}">
-        <p14:creationId xmlns:p14="http://schemas.microsoft.com/office/powerpoint/2010/main" val="1402815080"/>
+        <p14:creationId xmlns:p14="http://schemas.microsoft.com/office/powerpoint/2010/main" val="4124380272"/>
+      </p:ext>
+    </p:extLst>
+  </p:cSld>
+  <p:clrMapOvr>
+    <a:masterClrMapping/>
+  </p:clrMapOvr>
+  <p:timing>
+    <p:tnLst>
+      <p:par>
+        <p:cTn id="1" dur="indefinite" restart="never" nodeType="tmRoot"/>
+      </p:par>
+    </p:tnLst>
+  </p:timing>
+</p:sld>
+</file>
+
+<file path=ppt/slides/slide8.xml><?xml version="1.0" encoding="utf-8"?>
+<p:sld xmlns:a="http://schemas.openxmlformats.org/drawingml/2006/main" xmlns:r="http://schemas.openxmlformats.org/officeDocument/2006/relationships" xmlns:p="http://schemas.openxmlformats.org/presentationml/2006/main">
+  <p:cSld>
+    <p:spTree>
+      <p:nvGrpSpPr>
+        <p:cNvPr id="1" name=""/>
+        <p:cNvGrpSpPr/>
+        <p:nvPr/>
+      </p:nvGrpSpPr>
+      <p:grpSpPr>
+        <a:xfrm>
+          <a:off x="0" y="0"/>
+          <a:ext cx="0" cy="0"/>
+          <a:chOff x="0" y="0"/>
+          <a:chExt cx="0" cy="0"/>
+        </a:xfrm>
+      </p:grpSpPr>
+      <p:sp>
+        <p:nvSpPr>
+          <p:cNvPr id="2" name="Titel 1"/>
+          <p:cNvSpPr>
+            <a:spLocks noGrp="1"/>
+          </p:cNvSpPr>
+          <p:nvPr>
+            <p:ph type="title"/>
+          </p:nvPr>
+        </p:nvSpPr>
+        <p:spPr/>
+        <p:txBody>
+          <a:bodyPr/>
+          <a:lstStyle/>
+          <a:p>
+            <a:r>
+              <a:rPr lang="en-US" smtClean="0"/>
+              <a:t>1. Demo-Projekt</a:t>
+            </a:r>
+            <a:endParaRPr lang="de-DE"/>
+          </a:p>
+        </p:txBody>
+      </p:sp>
+      <p:sp>
+        <p:nvSpPr>
+          <p:cNvPr id="4" name="Abgerundetes Rechteck 3"/>
+          <p:cNvSpPr/>
+          <p:nvPr/>
+        </p:nvSpPr>
+        <p:spPr>
+          <a:xfrm>
+            <a:off x="1735359" y="1121781"/>
+            <a:ext cx="2242616" cy="720379"/>
+          </a:xfrm>
+          <a:prstGeom prst="roundRect">
+            <a:avLst/>
+          </a:prstGeom>
+        </p:spPr>
+        <p:style>
+          <a:lnRef idx="1">
+            <a:schemeClr val="accent3"/>
+          </a:lnRef>
+          <a:fillRef idx="3">
+            <a:schemeClr val="accent3"/>
+          </a:fillRef>
+          <a:effectRef idx="2">
+            <a:schemeClr val="accent3"/>
+          </a:effectRef>
+          <a:fontRef idx="minor">
+            <a:schemeClr val="lt1"/>
+          </a:fontRef>
+        </p:style>
+        <p:txBody>
+          <a:bodyPr rtlCol="0" anchor="ctr"/>
+          <a:lstStyle/>
+          <a:p>
+            <a:pPr algn="ctr"/>
+            <a:r>
+              <a:rPr lang="en-US" smtClean="0">
+                <a:solidFill>
+                  <a:schemeClr val="tx1"/>
+                </a:solidFill>
+              </a:rPr>
+              <a:t>App-Module</a:t>
+            </a:r>
+            <a:endParaRPr lang="de-DE">
+              <a:solidFill>
+                <a:schemeClr val="tx1"/>
+              </a:solidFill>
+            </a:endParaRPr>
+          </a:p>
+        </p:txBody>
+      </p:sp>
+      <p:sp>
+        <p:nvSpPr>
+          <p:cNvPr id="3" name="Rechteck 2"/>
+          <p:cNvSpPr/>
+          <p:nvPr/>
+        </p:nvSpPr>
+        <p:spPr>
+          <a:xfrm>
+            <a:off x="5132649" y="991410"/>
+            <a:ext cx="2235942" cy="500122"/>
+          </a:xfrm>
+          <a:prstGeom prst="rect">
+            <a:avLst/>
+          </a:prstGeom>
+        </p:spPr>
+        <p:style>
+          <a:lnRef idx="1">
+            <a:schemeClr val="accent1"/>
+          </a:lnRef>
+          <a:fillRef idx="3">
+            <a:schemeClr val="accent1"/>
+          </a:fillRef>
+          <a:effectRef idx="2">
+            <a:schemeClr val="accent1"/>
+          </a:effectRef>
+          <a:fontRef idx="minor">
+            <a:schemeClr val="lt1"/>
+          </a:fontRef>
+        </p:style>
+        <p:txBody>
+          <a:bodyPr rtlCol="0" anchor="ctr"/>
+          <a:lstStyle/>
+          <a:p>
+            <a:pPr algn="ctr"/>
+            <a:r>
+              <a:rPr lang="en-US" smtClean="0"/>
+              <a:t>Frame-Component</a:t>
+            </a:r>
+            <a:endParaRPr lang="de-DE"/>
+          </a:p>
+        </p:txBody>
+      </p:sp>
+      <p:sp>
+        <p:nvSpPr>
+          <p:cNvPr id="7" name="Rechteck 6"/>
+          <p:cNvSpPr/>
+          <p:nvPr/>
+        </p:nvSpPr>
+        <p:spPr>
+          <a:xfrm>
+            <a:off x="5132649" y="1550951"/>
+            <a:ext cx="2235942" cy="500122"/>
+          </a:xfrm>
+          <a:prstGeom prst="rect">
+            <a:avLst/>
+          </a:prstGeom>
+        </p:spPr>
+        <p:style>
+          <a:lnRef idx="1">
+            <a:schemeClr val="accent1"/>
+          </a:lnRef>
+          <a:fillRef idx="3">
+            <a:schemeClr val="accent1"/>
+          </a:fillRef>
+          <a:effectRef idx="2">
+            <a:schemeClr val="accent1"/>
+          </a:effectRef>
+          <a:fontRef idx="minor">
+            <a:schemeClr val="lt1"/>
+          </a:fontRef>
+        </p:style>
+        <p:txBody>
+          <a:bodyPr rtlCol="0" anchor="ctr"/>
+          <a:lstStyle/>
+          <a:p>
+            <a:pPr algn="ctr"/>
+            <a:r>
+              <a:rPr lang="en-US" smtClean="0"/>
+              <a:t>Home-Component</a:t>
+            </a:r>
+            <a:endParaRPr lang="de-DE"/>
+          </a:p>
+        </p:txBody>
+      </p:sp>
+      <p:sp>
+        <p:nvSpPr>
+          <p:cNvPr id="8" name="Rechteck 7"/>
+          <p:cNvSpPr/>
+          <p:nvPr/>
+        </p:nvSpPr>
+        <p:spPr>
+          <a:xfrm>
+            <a:off x="5132649" y="2443749"/>
+            <a:ext cx="2235942" cy="500122"/>
+          </a:xfrm>
+          <a:prstGeom prst="rect">
+            <a:avLst/>
+          </a:prstGeom>
+        </p:spPr>
+        <p:style>
+          <a:lnRef idx="1">
+            <a:schemeClr val="accent1"/>
+          </a:lnRef>
+          <a:fillRef idx="3">
+            <a:schemeClr val="accent1"/>
+          </a:fillRef>
+          <a:effectRef idx="2">
+            <a:schemeClr val="accent1"/>
+          </a:effectRef>
+          <a:fontRef idx="minor">
+            <a:schemeClr val="lt1"/>
+          </a:fontRef>
+        </p:style>
+        <p:txBody>
+          <a:bodyPr rtlCol="0" anchor="ctr"/>
+          <a:lstStyle/>
+          <a:p>
+            <a:pPr algn="ctr"/>
+            <a:r>
+              <a:rPr lang="en-US" smtClean="0"/>
+              <a:t>Page1-Component</a:t>
+            </a:r>
+            <a:endParaRPr lang="de-DE"/>
+          </a:p>
+        </p:txBody>
+      </p:sp>
+      <p:sp>
+        <p:nvSpPr>
+          <p:cNvPr id="9" name="Rechteck 8"/>
+          <p:cNvSpPr/>
+          <p:nvPr/>
+        </p:nvSpPr>
+        <p:spPr>
+          <a:xfrm>
+            <a:off x="5132649" y="3021046"/>
+            <a:ext cx="2235942" cy="500122"/>
+          </a:xfrm>
+          <a:prstGeom prst="rect">
+            <a:avLst/>
+          </a:prstGeom>
+        </p:spPr>
+        <p:style>
+          <a:lnRef idx="1">
+            <a:schemeClr val="accent1"/>
+          </a:lnRef>
+          <a:fillRef idx="3">
+            <a:schemeClr val="accent1"/>
+          </a:fillRef>
+          <a:effectRef idx="2">
+            <a:schemeClr val="accent1"/>
+          </a:effectRef>
+          <a:fontRef idx="minor">
+            <a:schemeClr val="lt1"/>
+          </a:fontRef>
+        </p:style>
+        <p:txBody>
+          <a:bodyPr rtlCol="0" anchor="ctr"/>
+          <a:lstStyle/>
+          <a:p>
+            <a:pPr algn="ctr"/>
+            <a:r>
+              <a:rPr lang="en-US" smtClean="0"/>
+              <a:t>Page2-Component</a:t>
+            </a:r>
+            <a:endParaRPr lang="de-DE"/>
+          </a:p>
+        </p:txBody>
+      </p:sp>
+      <p:sp>
+        <p:nvSpPr>
+          <p:cNvPr id="10" name="Rechteck 9"/>
+          <p:cNvSpPr/>
+          <p:nvPr/>
+        </p:nvSpPr>
+        <p:spPr>
+          <a:xfrm>
+            <a:off x="5132649" y="3598343"/>
+            <a:ext cx="2235942" cy="500122"/>
+          </a:xfrm>
+          <a:prstGeom prst="rect">
+            <a:avLst/>
+          </a:prstGeom>
+        </p:spPr>
+        <p:style>
+          <a:lnRef idx="1">
+            <a:schemeClr val="accent1"/>
+          </a:lnRef>
+          <a:fillRef idx="3">
+            <a:schemeClr val="accent1"/>
+          </a:fillRef>
+          <a:effectRef idx="2">
+            <a:schemeClr val="accent1"/>
+          </a:effectRef>
+          <a:fontRef idx="minor">
+            <a:schemeClr val="lt1"/>
+          </a:fontRef>
+        </p:style>
+        <p:txBody>
+          <a:bodyPr rtlCol="0" anchor="ctr"/>
+          <a:lstStyle/>
+          <a:p>
+            <a:pPr algn="ctr"/>
+            <a:r>
+              <a:rPr lang="en-US" smtClean="0"/>
+              <a:t>Page3-Component</a:t>
+            </a:r>
+            <a:endParaRPr lang="de-DE"/>
+          </a:p>
+        </p:txBody>
+      </p:sp>
+      <p:sp>
+        <p:nvSpPr>
+          <p:cNvPr id="11" name="Rechteck 10"/>
+          <p:cNvSpPr/>
+          <p:nvPr/>
+        </p:nvSpPr>
+        <p:spPr>
+          <a:xfrm>
+            <a:off x="5132649" y="4172874"/>
+            <a:ext cx="2235942" cy="500122"/>
+          </a:xfrm>
+          <a:prstGeom prst="rect">
+            <a:avLst/>
+          </a:prstGeom>
+        </p:spPr>
+        <p:style>
+          <a:lnRef idx="1">
+            <a:schemeClr val="accent6"/>
+          </a:lnRef>
+          <a:fillRef idx="3">
+            <a:schemeClr val="accent6"/>
+          </a:fillRef>
+          <a:effectRef idx="2">
+            <a:schemeClr val="accent6"/>
+          </a:effectRef>
+          <a:fontRef idx="minor">
+            <a:schemeClr val="lt1"/>
+          </a:fontRef>
+        </p:style>
+        <p:txBody>
+          <a:bodyPr rtlCol="0" anchor="ctr"/>
+          <a:lstStyle/>
+          <a:p>
+            <a:pPr algn="ctr"/>
+            <a:r>
+              <a:rPr lang="en-US" smtClean="0"/>
+              <a:t>Rounding-Pipe</a:t>
+            </a:r>
+            <a:endParaRPr lang="de-DE"/>
+          </a:p>
+        </p:txBody>
+      </p:sp>
+      <p:cxnSp>
+        <p:nvCxnSpPr>
+          <p:cNvPr id="13" name="Gerade Verbindung mit Pfeil 12"/>
+          <p:cNvCxnSpPr>
+            <a:stCxn id="5" idx="3"/>
+            <a:endCxn id="3" idx="1"/>
+          </p:cNvCxnSpPr>
+          <p:nvPr/>
+        </p:nvCxnSpPr>
+        <p:spPr>
+          <a:xfrm flipV="1">
+            <a:off x="4577563" y="1241471"/>
+            <a:ext cx="555086" cy="1113279"/>
+          </a:xfrm>
+          <a:prstGeom prst="straightConnector1">
+            <a:avLst/>
+          </a:prstGeom>
+          <a:ln>
+            <a:tailEnd type="triangle"/>
+          </a:ln>
+        </p:spPr>
+        <p:style>
+          <a:lnRef idx="2">
+            <a:schemeClr val="dk1"/>
+          </a:lnRef>
+          <a:fillRef idx="0">
+            <a:schemeClr val="dk1"/>
+          </a:fillRef>
+          <a:effectRef idx="1">
+            <a:schemeClr val="dk1"/>
+          </a:effectRef>
+          <a:fontRef idx="minor">
+            <a:schemeClr val="tx1"/>
+          </a:fontRef>
+        </p:style>
+      </p:cxnSp>
+      <p:cxnSp>
+        <p:nvCxnSpPr>
+          <p:cNvPr id="14" name="Gerade Verbindung mit Pfeil 13"/>
+          <p:cNvCxnSpPr>
+            <a:stCxn id="5" idx="3"/>
+            <a:endCxn id="7" idx="1"/>
+          </p:cNvCxnSpPr>
+          <p:nvPr/>
+        </p:nvCxnSpPr>
+        <p:spPr>
+          <a:xfrm flipV="1">
+            <a:off x="4577563" y="1801012"/>
+            <a:ext cx="555086" cy="553738"/>
+          </a:xfrm>
+          <a:prstGeom prst="straightConnector1">
+            <a:avLst/>
+          </a:prstGeom>
+          <a:ln>
+            <a:tailEnd type="triangle"/>
+          </a:ln>
+        </p:spPr>
+        <p:style>
+          <a:lnRef idx="2">
+            <a:schemeClr val="dk1"/>
+          </a:lnRef>
+          <a:fillRef idx="0">
+            <a:schemeClr val="dk1"/>
+          </a:fillRef>
+          <a:effectRef idx="1">
+            <a:schemeClr val="dk1"/>
+          </a:effectRef>
+          <a:fontRef idx="minor">
+            <a:schemeClr val="tx1"/>
+          </a:fontRef>
+        </p:style>
+      </p:cxnSp>
+      <p:cxnSp>
+        <p:nvCxnSpPr>
+          <p:cNvPr id="17" name="Gerade Verbindung mit Pfeil 16"/>
+          <p:cNvCxnSpPr>
+            <a:stCxn id="6" idx="3"/>
+            <a:endCxn id="8" idx="1"/>
+          </p:cNvCxnSpPr>
+          <p:nvPr/>
+        </p:nvCxnSpPr>
+        <p:spPr>
+          <a:xfrm flipV="1">
+            <a:off x="4590912" y="2693810"/>
+            <a:ext cx="541737" cy="533719"/>
+          </a:xfrm>
+          <a:prstGeom prst="straightConnector1">
+            <a:avLst/>
+          </a:prstGeom>
+          <a:ln>
+            <a:tailEnd type="triangle"/>
+          </a:ln>
+        </p:spPr>
+        <p:style>
+          <a:lnRef idx="2">
+            <a:schemeClr val="dk1"/>
+          </a:lnRef>
+          <a:fillRef idx="0">
+            <a:schemeClr val="dk1"/>
+          </a:fillRef>
+          <a:effectRef idx="1">
+            <a:schemeClr val="dk1"/>
+          </a:effectRef>
+          <a:fontRef idx="minor">
+            <a:schemeClr val="tx1"/>
+          </a:fontRef>
+        </p:style>
+      </p:cxnSp>
+      <p:cxnSp>
+        <p:nvCxnSpPr>
+          <p:cNvPr id="20" name="Gerade Verbindung mit Pfeil 19"/>
+          <p:cNvCxnSpPr>
+            <a:stCxn id="6" idx="3"/>
+            <a:endCxn id="9" idx="1"/>
+          </p:cNvCxnSpPr>
+          <p:nvPr/>
+        </p:nvCxnSpPr>
+        <p:spPr>
+          <a:xfrm>
+            <a:off x="4590912" y="3227529"/>
+            <a:ext cx="541737" cy="43578"/>
+          </a:xfrm>
+          <a:prstGeom prst="straightConnector1">
+            <a:avLst/>
+          </a:prstGeom>
+          <a:ln>
+            <a:tailEnd type="triangle"/>
+          </a:ln>
+        </p:spPr>
+        <p:style>
+          <a:lnRef idx="2">
+            <a:schemeClr val="dk1"/>
+          </a:lnRef>
+          <a:fillRef idx="0">
+            <a:schemeClr val="dk1"/>
+          </a:fillRef>
+          <a:effectRef idx="1">
+            <a:schemeClr val="dk1"/>
+          </a:effectRef>
+          <a:fontRef idx="minor">
+            <a:schemeClr val="tx1"/>
+          </a:fontRef>
+        </p:style>
+      </p:cxnSp>
+      <p:cxnSp>
+        <p:nvCxnSpPr>
+          <p:cNvPr id="23" name="Gerade Verbindung mit Pfeil 22"/>
+          <p:cNvCxnSpPr>
+            <a:stCxn id="6" idx="3"/>
+            <a:endCxn id="10" idx="1"/>
+          </p:cNvCxnSpPr>
+          <p:nvPr/>
+        </p:nvCxnSpPr>
+        <p:spPr>
+          <a:xfrm>
+            <a:off x="4590912" y="3227529"/>
+            <a:ext cx="541737" cy="620875"/>
+          </a:xfrm>
+          <a:prstGeom prst="straightConnector1">
+            <a:avLst/>
+          </a:prstGeom>
+          <a:ln>
+            <a:tailEnd type="triangle"/>
+          </a:ln>
+        </p:spPr>
+        <p:style>
+          <a:lnRef idx="2">
+            <a:schemeClr val="dk1"/>
+          </a:lnRef>
+          <a:fillRef idx="0">
+            <a:schemeClr val="dk1"/>
+          </a:fillRef>
+          <a:effectRef idx="1">
+            <a:schemeClr val="dk1"/>
+          </a:effectRef>
+          <a:fontRef idx="minor">
+            <a:schemeClr val="tx1"/>
+          </a:fontRef>
+        </p:style>
+      </p:cxnSp>
+      <p:cxnSp>
+        <p:nvCxnSpPr>
+          <p:cNvPr id="26" name="Gerade Verbindung mit Pfeil 25"/>
+          <p:cNvCxnSpPr>
+            <a:stCxn id="6" idx="3"/>
+            <a:endCxn id="11" idx="1"/>
+          </p:cNvCxnSpPr>
+          <p:nvPr/>
+        </p:nvCxnSpPr>
+        <p:spPr>
+          <a:xfrm>
+            <a:off x="4590912" y="3227529"/>
+            <a:ext cx="541737" cy="1195406"/>
+          </a:xfrm>
+          <a:prstGeom prst="straightConnector1">
+            <a:avLst/>
+          </a:prstGeom>
+          <a:ln>
+            <a:tailEnd type="triangle"/>
+          </a:ln>
+        </p:spPr>
+        <p:style>
+          <a:lnRef idx="2">
+            <a:schemeClr val="dk1"/>
+          </a:lnRef>
+          <a:fillRef idx="0">
+            <a:schemeClr val="dk1"/>
+          </a:fillRef>
+          <a:effectRef idx="1">
+            <a:schemeClr val="dk1"/>
+          </a:effectRef>
+          <a:fontRef idx="minor">
+            <a:schemeClr val="tx1"/>
+          </a:fontRef>
+        </p:style>
+      </p:cxnSp>
+      <p:sp>
+        <p:nvSpPr>
+          <p:cNvPr id="5" name="Abgerundetes Rechteck 4"/>
+          <p:cNvSpPr/>
+          <p:nvPr/>
+        </p:nvSpPr>
+        <p:spPr>
+          <a:xfrm>
+            <a:off x="2334947" y="1994560"/>
+            <a:ext cx="2242616" cy="720379"/>
+          </a:xfrm>
+          <a:prstGeom prst="roundRect">
+            <a:avLst/>
+          </a:prstGeom>
+        </p:spPr>
+        <p:style>
+          <a:lnRef idx="1">
+            <a:schemeClr val="accent3"/>
+          </a:lnRef>
+          <a:fillRef idx="3">
+            <a:schemeClr val="accent3"/>
+          </a:fillRef>
+          <a:effectRef idx="2">
+            <a:schemeClr val="accent3"/>
+          </a:effectRef>
+          <a:fontRef idx="minor">
+            <a:schemeClr val="lt1"/>
+          </a:fontRef>
+        </p:style>
+        <p:txBody>
+          <a:bodyPr rtlCol="0" anchor="ctr"/>
+          <a:lstStyle/>
+          <a:p>
+            <a:pPr algn="ctr"/>
+            <a:r>
+              <a:rPr lang="en-US" smtClean="0">
+                <a:solidFill>
+                  <a:schemeClr val="tx1"/>
+                </a:solidFill>
+              </a:rPr>
+              <a:t>Home-Module</a:t>
+            </a:r>
+            <a:endParaRPr lang="de-DE">
+              <a:solidFill>
+                <a:schemeClr val="tx1"/>
+              </a:solidFill>
+            </a:endParaRPr>
+          </a:p>
+        </p:txBody>
+      </p:sp>
+      <p:sp>
+        <p:nvSpPr>
+          <p:cNvPr id="6" name="Abgerundetes Rechteck 5"/>
+          <p:cNvSpPr/>
+          <p:nvPr/>
+        </p:nvSpPr>
+        <p:spPr>
+          <a:xfrm>
+            <a:off x="2348296" y="2867339"/>
+            <a:ext cx="2242616" cy="720379"/>
+          </a:xfrm>
+          <a:prstGeom prst="roundRect">
+            <a:avLst/>
+          </a:prstGeom>
+        </p:spPr>
+        <p:style>
+          <a:lnRef idx="1">
+            <a:schemeClr val="accent3"/>
+          </a:lnRef>
+          <a:fillRef idx="3">
+            <a:schemeClr val="accent3"/>
+          </a:fillRef>
+          <a:effectRef idx="2">
+            <a:schemeClr val="accent3"/>
+          </a:effectRef>
+          <a:fontRef idx="minor">
+            <a:schemeClr val="lt1"/>
+          </a:fontRef>
+        </p:style>
+        <p:txBody>
+          <a:bodyPr rtlCol="0" anchor="ctr"/>
+          <a:lstStyle/>
+          <a:p>
+            <a:pPr algn="ctr"/>
+            <a:r>
+              <a:rPr lang="en-US" smtClean="0">
+                <a:solidFill>
+                  <a:schemeClr val="tx1"/>
+                </a:solidFill>
+              </a:rPr>
+              <a:t>Pages-Module</a:t>
+            </a:r>
+            <a:endParaRPr lang="de-DE">
+              <a:solidFill>
+                <a:schemeClr val="tx1"/>
+              </a:solidFill>
+            </a:endParaRPr>
+          </a:p>
+        </p:txBody>
+      </p:sp>
+    </p:spTree>
+    <p:extLst>
+      <p:ext uri="{BB962C8B-B14F-4D97-AF65-F5344CB8AC3E}">
+        <p14:creationId xmlns:p14="http://schemas.microsoft.com/office/powerpoint/2010/main" val="2866371091"/>
+      </p:ext>
+    </p:extLst>
+  </p:cSld>
+  <p:clrMapOvr>
+    <a:masterClrMapping/>
+  </p:clrMapOvr>
+  <p:timing>
+    <p:tnLst>
+      <p:par>
+        <p:cTn id="1" dur="indefinite" restart="never" nodeType="tmRoot"/>
+      </p:par>
+    </p:tnLst>
+  </p:timing>
+</p:sld>
+</file>
+
+<file path=ppt/slides/slide9.xml><?xml version="1.0" encoding="utf-8"?>
+<p:sld xmlns:a="http://schemas.openxmlformats.org/drawingml/2006/main" xmlns:r="http://schemas.openxmlformats.org/officeDocument/2006/relationships" xmlns:p="http://schemas.openxmlformats.org/presentationml/2006/main">
+  <p:cSld>
+    <p:spTree>
+      <p:nvGrpSpPr>
+        <p:cNvPr id="1" name=""/>
+        <p:cNvGrpSpPr/>
+        <p:nvPr/>
+      </p:nvGrpSpPr>
+      <p:grpSpPr>
+        <a:xfrm>
+          <a:off x="0" y="0"/>
+          <a:ext cx="0" cy="0"/>
+          <a:chOff x="0" y="0"/>
+          <a:chExt cx="0" cy="0"/>
+        </a:xfrm>
+      </p:grpSpPr>
+      <p:sp>
+        <p:nvSpPr>
+          <p:cNvPr id="2" name="Titel 1"/>
+          <p:cNvSpPr>
+            <a:spLocks noGrp="1"/>
+          </p:cNvSpPr>
+          <p:nvPr>
+            <p:ph type="title"/>
+          </p:nvPr>
+        </p:nvSpPr>
+        <p:spPr/>
+        <p:txBody>
+          <a:bodyPr>
+            <a:normAutofit fontScale="90000"/>
+          </a:bodyPr>
+          <a:lstStyle/>
+          <a:p>
+            <a:r>
+              <a:rPr lang="en-US" smtClean="0"/>
+              <a:t>2. </a:t>
+            </a:r>
+            <a:r>
+              <a:rPr lang="en-US"/>
+              <a:t>ngx-translate </a:t>
+            </a:r>
+            <a:r>
+              <a:rPr lang="en-US" smtClean="0"/>
+              <a:t>( </a:t>
+            </a:r>
+            <a:r>
+              <a:rPr lang="en-US" sz="1800" smtClean="0">
+                <a:hlinkClick r:id="rId2"/>
+              </a:rPr>
+              <a:t>https</a:t>
+            </a:r>
+            <a:r>
+              <a:rPr lang="en-US" sz="1800">
+                <a:hlinkClick r:id="rId2"/>
+              </a:rPr>
+              <a:t>://www.npmjs.com/package</a:t>
+            </a:r>
+            <a:r>
+              <a:rPr lang="en-US" sz="1800">
+                <a:hlinkClick r:id="rId2"/>
+              </a:rPr>
+              <a:t>/@</a:t>
+            </a:r>
+            <a:r>
+              <a:rPr lang="en-US" sz="1800" smtClean="0">
+                <a:hlinkClick r:id="rId2"/>
+              </a:rPr>
+              <a:t>ngx-translate/core</a:t>
+            </a:r>
+            <a:r>
+              <a:rPr lang="en-US" smtClean="0"/>
+              <a:t> )</a:t>
+            </a:r>
+            <a:endParaRPr lang="de-DE"/>
+          </a:p>
+        </p:txBody>
+      </p:sp>
+      <p:sp>
+        <p:nvSpPr>
+          <p:cNvPr id="4" name="Abgerundetes Rechteck 3"/>
+          <p:cNvSpPr/>
+          <p:nvPr/>
+        </p:nvSpPr>
+        <p:spPr>
+          <a:xfrm>
+            <a:off x="1581841" y="1797426"/>
+            <a:ext cx="2242616" cy="720379"/>
+          </a:xfrm>
+          <a:prstGeom prst="roundRect">
+            <a:avLst/>
+          </a:prstGeom>
+        </p:spPr>
+        <p:style>
+          <a:lnRef idx="1">
+            <a:schemeClr val="accent3"/>
+          </a:lnRef>
+          <a:fillRef idx="3">
+            <a:schemeClr val="accent3"/>
+          </a:fillRef>
+          <a:effectRef idx="2">
+            <a:schemeClr val="accent3"/>
+          </a:effectRef>
+          <a:fontRef idx="minor">
+            <a:schemeClr val="lt1"/>
+          </a:fontRef>
+        </p:style>
+        <p:txBody>
+          <a:bodyPr rtlCol="0" anchor="ctr"/>
+          <a:lstStyle/>
+          <a:p>
+            <a:pPr algn="ctr"/>
+            <a:r>
+              <a:rPr lang="en-US" smtClean="0">
+                <a:solidFill>
+                  <a:schemeClr val="tx1"/>
+                </a:solidFill>
+              </a:rPr>
+              <a:t>Translate-Module</a:t>
+            </a:r>
+            <a:endParaRPr lang="de-DE">
+              <a:solidFill>
+                <a:schemeClr val="tx1"/>
+              </a:solidFill>
+            </a:endParaRPr>
+          </a:p>
+        </p:txBody>
+      </p:sp>
+      <p:sp>
+        <p:nvSpPr>
+          <p:cNvPr id="3" name="Rechteck 2"/>
+          <p:cNvSpPr/>
+          <p:nvPr/>
+        </p:nvSpPr>
+        <p:spPr>
+          <a:xfrm>
+            <a:off x="844316" y="3763719"/>
+            <a:ext cx="1878854" cy="500122"/>
+          </a:xfrm>
+          <a:prstGeom prst="rect">
+            <a:avLst/>
+          </a:prstGeom>
+        </p:spPr>
+        <p:style>
+          <a:lnRef idx="1">
+            <a:schemeClr val="accent1"/>
+          </a:lnRef>
+          <a:fillRef idx="3">
+            <a:schemeClr val="accent1"/>
+          </a:fillRef>
+          <a:effectRef idx="2">
+            <a:schemeClr val="accent1"/>
+          </a:effectRef>
+          <a:fontRef idx="minor">
+            <a:schemeClr val="lt1"/>
+          </a:fontRef>
+        </p:style>
+        <p:txBody>
+          <a:bodyPr rtlCol="0" anchor="ctr"/>
+          <a:lstStyle/>
+          <a:p>
+            <a:pPr algn="ctr"/>
+            <a:r>
+              <a:rPr lang="en-US" smtClean="0"/>
+              <a:t>Translate-Pipe</a:t>
+            </a:r>
+            <a:endParaRPr lang="de-DE"/>
+          </a:p>
+        </p:txBody>
+      </p:sp>
+      <p:sp>
+        <p:nvSpPr>
+          <p:cNvPr id="18" name="Rechteck 17"/>
+          <p:cNvSpPr/>
+          <p:nvPr/>
+        </p:nvSpPr>
+        <p:spPr>
+          <a:xfrm>
+            <a:off x="2783244" y="3763719"/>
+            <a:ext cx="2074074" cy="500122"/>
+          </a:xfrm>
+          <a:prstGeom prst="rect">
+            <a:avLst/>
+          </a:prstGeom>
+        </p:spPr>
+        <p:style>
+          <a:lnRef idx="1">
+            <a:schemeClr val="accent1"/>
+          </a:lnRef>
+          <a:fillRef idx="3">
+            <a:schemeClr val="accent1"/>
+          </a:fillRef>
+          <a:effectRef idx="2">
+            <a:schemeClr val="accent1"/>
+          </a:effectRef>
+          <a:fontRef idx="minor">
+            <a:schemeClr val="lt1"/>
+          </a:fontRef>
+        </p:style>
+        <p:txBody>
+          <a:bodyPr rtlCol="0" anchor="ctr"/>
+          <a:lstStyle/>
+          <a:p>
+            <a:pPr algn="ctr"/>
+            <a:r>
+              <a:rPr lang="en-US" smtClean="0"/>
+              <a:t>Translate-Direktive</a:t>
+            </a:r>
+            <a:endParaRPr lang="de-DE"/>
+          </a:p>
+        </p:txBody>
+      </p:sp>
+      <p:sp>
+        <p:nvSpPr>
+          <p:cNvPr id="19" name="Rechteck 18"/>
+          <p:cNvSpPr/>
+          <p:nvPr/>
+        </p:nvSpPr>
+        <p:spPr>
+          <a:xfrm>
+            <a:off x="2234260" y="2597540"/>
+            <a:ext cx="2235942" cy="500122"/>
+          </a:xfrm>
+          <a:prstGeom prst="rect">
+            <a:avLst/>
+          </a:prstGeom>
+        </p:spPr>
+        <p:style>
+          <a:lnRef idx="1">
+            <a:schemeClr val="accent4"/>
+          </a:lnRef>
+          <a:fillRef idx="3">
+            <a:schemeClr val="accent4"/>
+          </a:fillRef>
+          <a:effectRef idx="2">
+            <a:schemeClr val="accent4"/>
+          </a:effectRef>
+          <a:fontRef idx="minor">
+            <a:schemeClr val="lt1"/>
+          </a:fontRef>
+        </p:style>
+        <p:txBody>
+          <a:bodyPr rtlCol="0" anchor="ctr"/>
+          <a:lstStyle/>
+          <a:p>
+            <a:pPr algn="ctr"/>
+            <a:r>
+              <a:rPr lang="en-US" smtClean="0"/>
+              <a:t>Translate-Loader</a:t>
+            </a:r>
+            <a:endParaRPr lang="de-DE"/>
+          </a:p>
+        </p:txBody>
+      </p:sp>
+      <p:cxnSp>
+        <p:nvCxnSpPr>
+          <p:cNvPr id="15" name="Gerader Verbinder 14"/>
+          <p:cNvCxnSpPr/>
+          <p:nvPr/>
+        </p:nvCxnSpPr>
+        <p:spPr>
+          <a:xfrm>
+            <a:off x="1188053" y="1675288"/>
+            <a:ext cx="6874686" cy="0"/>
+          </a:xfrm>
+          <a:prstGeom prst="line">
+            <a:avLst/>
+          </a:prstGeom>
+          <a:ln w="9525" cap="flat" cmpd="sng" algn="ctr">
+            <a:solidFill>
+              <a:schemeClr val="dk1"/>
+            </a:solidFill>
+            <a:prstDash val="dash"/>
+            <a:round/>
+            <a:headEnd type="none" w="med" len="med"/>
+            <a:tailEnd type="none" w="med" len="med"/>
+          </a:ln>
+        </p:spPr>
+        <p:style>
+          <a:lnRef idx="0">
+            <a:scrgbClr r="0" g="0" b="0"/>
+          </a:lnRef>
+          <a:fillRef idx="0">
+            <a:scrgbClr r="0" g="0" b="0"/>
+          </a:fillRef>
+          <a:effectRef idx="0">
+            <a:scrgbClr r="0" g="0" b="0"/>
+          </a:effectRef>
+          <a:fontRef idx="minor">
+            <a:schemeClr val="tx1"/>
+          </a:fontRef>
+        </p:style>
+      </p:cxnSp>
+      <p:cxnSp>
+        <p:nvCxnSpPr>
+          <p:cNvPr id="22" name="Gerader Verbinder 21"/>
+          <p:cNvCxnSpPr/>
+          <p:nvPr/>
+        </p:nvCxnSpPr>
+        <p:spPr>
+          <a:xfrm>
+            <a:off x="5359585" y="1248584"/>
+            <a:ext cx="0" cy="3563696"/>
+          </a:xfrm>
+          <a:prstGeom prst="line">
+            <a:avLst/>
+          </a:prstGeom>
+          <a:ln w="9525" cap="flat" cmpd="sng" algn="ctr">
+            <a:solidFill>
+              <a:schemeClr val="dk1"/>
+            </a:solidFill>
+            <a:prstDash val="dash"/>
+            <a:round/>
+            <a:headEnd type="none" w="med" len="med"/>
+            <a:tailEnd type="none" w="med" len="med"/>
+          </a:ln>
+        </p:spPr>
+        <p:style>
+          <a:lnRef idx="0">
+            <a:scrgbClr r="0" g="0" b="0"/>
+          </a:lnRef>
+          <a:fillRef idx="0">
+            <a:scrgbClr r="0" g="0" b="0"/>
+          </a:fillRef>
+          <a:effectRef idx="0">
+            <a:scrgbClr r="0" g="0" b="0"/>
+          </a:effectRef>
+          <a:fontRef idx="minor">
+            <a:schemeClr val="tx1"/>
+          </a:fontRef>
+        </p:style>
+      </p:cxnSp>
+      <p:sp>
+        <p:nvSpPr>
+          <p:cNvPr id="27" name="Rechteck 26"/>
+          <p:cNvSpPr/>
+          <p:nvPr/>
+        </p:nvSpPr>
+        <p:spPr>
+          <a:xfrm>
+            <a:off x="5643794" y="2567018"/>
+            <a:ext cx="2605830" cy="500122"/>
+          </a:xfrm>
+          <a:prstGeom prst="rect">
+            <a:avLst/>
+          </a:prstGeom>
+        </p:spPr>
+        <p:style>
+          <a:lnRef idx="1">
+            <a:schemeClr val="accent6"/>
+          </a:lnRef>
+          <a:fillRef idx="3">
+            <a:schemeClr val="accent6"/>
+          </a:fillRef>
+          <a:effectRef idx="2">
+            <a:schemeClr val="accent6"/>
+          </a:effectRef>
+          <a:fontRef idx="minor">
+            <a:schemeClr val="lt1"/>
+          </a:fontRef>
+        </p:style>
+        <p:txBody>
+          <a:bodyPr rtlCol="0" anchor="ctr"/>
+          <a:lstStyle/>
+          <a:p>
+            <a:pPr algn="ctr"/>
+            <a:r>
+              <a:rPr lang="en-US" smtClean="0"/>
+              <a:t>Translate-Http-Loader</a:t>
+            </a:r>
+            <a:endParaRPr lang="de-DE"/>
+          </a:p>
+        </p:txBody>
+      </p:sp>
+      <p:sp>
+        <p:nvSpPr>
+          <p:cNvPr id="28" name="Textfeld 27"/>
+          <p:cNvSpPr txBox="1"/>
+          <p:nvPr/>
+        </p:nvSpPr>
+        <p:spPr>
+          <a:xfrm>
+            <a:off x="2309360" y="1248584"/>
+            <a:ext cx="1675287" cy="369332"/>
+          </a:xfrm>
+          <a:prstGeom prst="rect">
+            <a:avLst/>
+          </a:prstGeom>
+          <a:noFill/>
+        </p:spPr>
+        <p:txBody>
+          <a:bodyPr wrap="square" rtlCol="0">
+            <a:spAutoFit/>
+          </a:bodyPr>
+          <a:lstStyle/>
+          <a:p>
+            <a:r>
+              <a:rPr lang="en-US" smtClean="0"/>
+              <a:t>Core</a:t>
+            </a:r>
+            <a:endParaRPr lang="de-DE"/>
+          </a:p>
+        </p:txBody>
+      </p:sp>
+      <p:sp>
+        <p:nvSpPr>
+          <p:cNvPr id="29" name="Textfeld 28"/>
+          <p:cNvSpPr txBox="1"/>
+          <p:nvPr/>
+        </p:nvSpPr>
+        <p:spPr>
+          <a:xfrm>
+            <a:off x="5985871" y="1216318"/>
+            <a:ext cx="1675287" cy="369332"/>
+          </a:xfrm>
+          <a:prstGeom prst="rect">
+            <a:avLst/>
+          </a:prstGeom>
+          <a:noFill/>
+        </p:spPr>
+        <p:txBody>
+          <a:bodyPr wrap="square" rtlCol="0">
+            <a:spAutoFit/>
+          </a:bodyPr>
+          <a:lstStyle/>
+          <a:p>
+            <a:r>
+              <a:rPr lang="en-US" smtClean="0"/>
+              <a:t>Http-Loader</a:t>
+            </a:r>
+            <a:endParaRPr lang="de-DE"/>
+          </a:p>
+        </p:txBody>
+      </p:sp>
+      <p:sp>
+        <p:nvSpPr>
+          <p:cNvPr id="30" name="Rechteck 29"/>
+          <p:cNvSpPr/>
+          <p:nvPr/>
+        </p:nvSpPr>
+        <p:spPr>
+          <a:xfrm>
+            <a:off x="2234260" y="3177397"/>
+            <a:ext cx="2235942" cy="500122"/>
+          </a:xfrm>
+          <a:prstGeom prst="rect">
+            <a:avLst/>
+          </a:prstGeom>
+        </p:spPr>
+        <p:style>
+          <a:lnRef idx="1">
+            <a:schemeClr val="accent4"/>
+          </a:lnRef>
+          <a:fillRef idx="3">
+            <a:schemeClr val="accent4"/>
+          </a:fillRef>
+          <a:effectRef idx="2">
+            <a:schemeClr val="accent4"/>
+          </a:effectRef>
+          <a:fontRef idx="minor">
+            <a:schemeClr val="lt1"/>
+          </a:fontRef>
+        </p:style>
+        <p:txBody>
+          <a:bodyPr rtlCol="0" anchor="ctr"/>
+          <a:lstStyle/>
+          <a:p>
+            <a:pPr algn="ctr"/>
+            <a:r>
+              <a:rPr lang="en-US" smtClean="0"/>
+              <a:t>Translate-Service</a:t>
+            </a:r>
+            <a:endParaRPr lang="de-DE"/>
+          </a:p>
+        </p:txBody>
+      </p:sp>
+    </p:spTree>
+    <p:extLst>
+      <p:ext uri="{BB962C8B-B14F-4D97-AF65-F5344CB8AC3E}">
+        <p14:creationId xmlns:p14="http://schemas.microsoft.com/office/powerpoint/2010/main" val="2908305227"/>
       </p:ext>
     </p:extLst>
   </p:cSld>
@@ -2892,23 +4714,6 @@
 </file>
 
 <file path=customXml/item1.xml><?xml version="1.0" encoding="utf-8"?>
-<?mso-contentType ?>
-<FormTemplates xmlns="http://schemas.microsoft.com/sharepoint/v3/contenttype/forms">
-  <Display>DocumentLibraryForm</Display>
-  <Edit>DocumentLibraryForm</Edit>
-  <New>DocumentLibraryForm</New>
-</FormTemplates>
-</file>
-
-<file path=customXml/item2.xml><?xml version="1.0" encoding="utf-8"?>
-<p:properties xmlns:p="http://schemas.microsoft.com/office/2006/metadata/properties" xmlns:xsi="http://www.w3.org/2001/XMLSchema-instance" xmlns:pc="http://schemas.microsoft.com/office/infopath/2007/PartnerControls">
-  <documentManagement>
-    <cp_x0020_zus_x00e4_tzliche_x0020_Infos xmlns="07b6bc22-5999-492b-a352-9248244f8d21" xsi:nil="true"/>
-  </documentManagement>
-</p:properties>
-</file>
-
-<file path=customXml/item3.xml><?xml version="1.0" encoding="utf-8"?>
 <ct:contentTypeSchema xmlns:ct="http://schemas.microsoft.com/office/2006/metadata/contentType" xmlns:ma="http://schemas.microsoft.com/office/2006/metadata/properties/metaAttributes" ct:_="" ma:_="" ma:contentTypeName="cp Besprechungsprotokoll" ma:contentTypeID="0x010100FE20C9D9F617034D8570930FE66A4CC300919FD76D6B24A842B82AFCB64E421821" ma:contentTypeVersion="2" ma:contentTypeDescription="" ma:contentTypeScope="" ma:versionID="5b8107a2bbedeff17410256563bf49f9">
   <xsd:schema xmlns:xsd="http://www.w3.org/2001/XMLSchema" xmlns:xs="http://www.w3.org/2001/XMLSchema" xmlns:p="http://schemas.microsoft.com/office/2006/metadata/properties" xmlns:ns2="07b6bc22-5999-492b-a352-9248244f8d21" targetNamespace="http://schemas.microsoft.com/office/2006/metadata/properties" ma:root="true" ma:fieldsID="3cf7d76273d31b7b76c2011acd6906db" ns2:_="">
     <xsd:import namespace="07b6bc22-5999-492b-a352-9248244f8d21"/>
@@ -3036,10 +4841,37 @@
 </ct:contentTypeSchema>
 </file>
 
+<file path=customXml/item2.xml><?xml version="1.0" encoding="utf-8"?>
+<p:properties xmlns:p="http://schemas.microsoft.com/office/2006/metadata/properties" xmlns:xsi="http://www.w3.org/2001/XMLSchema-instance" xmlns:pc="http://schemas.microsoft.com/office/infopath/2007/PartnerControls">
+  <documentManagement>
+    <cp_x0020_zus_x00e4_tzliche_x0020_Infos xmlns="07b6bc22-5999-492b-a352-9248244f8d21" xsi:nil="true"/>
+  </documentManagement>
+</p:properties>
+</file>
+
+<file path=customXml/item3.xml><?xml version="1.0" encoding="utf-8"?>
+<?mso-contentType ?>
+<FormTemplates xmlns="http://schemas.microsoft.com/sharepoint/v3/contenttype/forms">
+  <Display>DocumentLibraryForm</Display>
+  <Edit>DocumentLibraryForm</Edit>
+  <New>DocumentLibraryForm</New>
+</FormTemplates>
+</file>
+
 <file path=customXml/itemProps1.xml><?xml version="1.0" encoding="utf-8"?>
-<ds:datastoreItem xmlns:ds="http://schemas.openxmlformats.org/officeDocument/2006/customXml" ds:itemID="{D455443A-2FF7-43ED-8823-8BF9C21F5DB5}">
+<ds:datastoreItem xmlns:ds="http://schemas.openxmlformats.org/officeDocument/2006/customXml" ds:itemID="{B8520066-D0FF-4151-8B8E-5E756C5BE6D2}">
   <ds:schemaRefs>
-    <ds:schemaRef ds:uri="http://schemas.microsoft.com/sharepoint/v3/contenttype/forms"/>
+    <ds:schemaRef ds:uri="http://schemas.microsoft.com/office/2006/metadata/contentType"/>
+    <ds:schemaRef ds:uri="http://schemas.microsoft.com/office/2006/metadata/properties/metaAttributes"/>
+    <ds:schemaRef ds:uri="http://www.w3.org/2001/XMLSchema"/>
+    <ds:schemaRef ds:uri="http://schemas.microsoft.com/office/2006/metadata/properties"/>
+    <ds:schemaRef ds:uri="07b6bc22-5999-492b-a352-9248244f8d21"/>
+    <ds:schemaRef ds:uri="http://schemas.microsoft.com/office/2006/documentManagement/types"/>
+    <ds:schemaRef ds:uri="http://schemas.microsoft.com/office/infopath/2007/PartnerControls"/>
+    <ds:schemaRef ds:uri="http://schemas.openxmlformats.org/package/2006/metadata/core-properties"/>
+    <ds:schemaRef ds:uri="http://purl.org/dc/elements/1.1/"/>
+    <ds:schemaRef ds:uri="http://purl.org/dc/terms/"/>
+    <ds:schemaRef ds:uri="http://schemas.microsoft.com/internal/obd"/>
   </ds:schemaRefs>
 </ds:datastoreItem>
 </file>
@@ -3055,19 +4887,9 @@
 </file>
 
 <file path=customXml/itemProps3.xml><?xml version="1.0" encoding="utf-8"?>
-<ds:datastoreItem xmlns:ds="http://schemas.openxmlformats.org/officeDocument/2006/customXml" ds:itemID="{B8520066-D0FF-4151-8B8E-5E756C5BE6D2}">
+<ds:datastoreItem xmlns:ds="http://schemas.openxmlformats.org/officeDocument/2006/customXml" ds:itemID="{D455443A-2FF7-43ED-8823-8BF9C21F5DB5}">
   <ds:schemaRefs>
-    <ds:schemaRef ds:uri="http://schemas.microsoft.com/office/2006/metadata/contentType"/>
-    <ds:schemaRef ds:uri="http://schemas.microsoft.com/office/2006/metadata/properties/metaAttributes"/>
-    <ds:schemaRef ds:uri="http://www.w3.org/2001/XMLSchema"/>
-    <ds:schemaRef ds:uri="http://schemas.microsoft.com/office/2006/metadata/properties"/>
-    <ds:schemaRef ds:uri="07b6bc22-5999-492b-a352-9248244f8d21"/>
-    <ds:schemaRef ds:uri="http://schemas.microsoft.com/office/2006/documentManagement/types"/>
-    <ds:schemaRef ds:uri="http://schemas.microsoft.com/office/infopath/2007/PartnerControls"/>
-    <ds:schemaRef ds:uri="http://schemas.openxmlformats.org/package/2006/metadata/core-properties"/>
-    <ds:schemaRef ds:uri="http://purl.org/dc/elements/1.1/"/>
-    <ds:schemaRef ds:uri="http://purl.org/dc/terms/"/>
-    <ds:schemaRef ds:uri="http://schemas.microsoft.com/internal/obd"/>
+    <ds:schemaRef ds:uri="http://schemas.microsoft.com/sharepoint/v3/contenttype/forms"/>
   </ds:schemaRefs>
 </ds:datastoreItem>
 </file>
</xml_diff>